<commit_message>
Thêm giải thích các chức năng cơ bản của Python
</commit_message>
<xml_diff>
--- a/Yolov1/Documentation/Yolov1_implementation.pptx
+++ b/Yolov1/Documentation/Yolov1_implementation.pptx
@@ -7,6 +7,9 @@
   <p:sldIdLst>
     <p:sldId id="257" r:id="rId2"/>
     <p:sldId id="256" r:id="rId3"/>
+    <p:sldId id="258" r:id="rId4"/>
+    <p:sldId id="259" r:id="rId5"/>
+    <p:sldId id="260" r:id="rId6"/>
   </p:sldIdLst>
   <p:sldSz cx="9601200" cy="12801600" type="A3"/>
   <p:notesSz cx="6858000" cy="9144000"/>
@@ -105,6 +108,11 @@
       </a:defRPr>
     </a:lvl9pPr>
   </p:defaultTextStyle>
+  <p:extLst>
+    <p:ext uri="{EFAFB233-063F-42B5-8137-9DF3F51BA10A}">
+      <p15:sldGuideLst xmlns:p15="http://schemas.microsoft.com/office/powerpoint/2012/main"/>
+    </p:ext>
+  </p:extLst>
 </p:presentation>
 </file>
 
@@ -12458,6 +12466,3475 @@
 </p:sld>
 </file>
 
+<file path=ppt/slides/slide3.xml><?xml version="1.0" encoding="utf-8"?>
+<p:sld xmlns:a="http://schemas.openxmlformats.org/drawingml/2006/main" xmlns:r="http://schemas.openxmlformats.org/officeDocument/2006/relationships" xmlns:p="http://schemas.openxmlformats.org/presentationml/2006/main">
+  <p:cSld>
+    <p:spTree>
+      <p:nvGrpSpPr>
+        <p:cNvPr id="1" name=""/>
+        <p:cNvGrpSpPr/>
+        <p:nvPr/>
+      </p:nvGrpSpPr>
+      <p:grpSpPr>
+        <a:xfrm>
+          <a:off x="0" y="0"/>
+          <a:ext cx="0" cy="0"/>
+          <a:chOff x="0" y="0"/>
+          <a:chExt cx="0" cy="0"/>
+        </a:xfrm>
+      </p:grpSpPr>
+      <p:sp>
+        <p:nvSpPr>
+          <p:cNvPr id="4" name="TextBox 3">
+            <a:extLst>
+              <a:ext uri="{FF2B5EF4-FFF2-40B4-BE49-F238E27FC236}">
+                <a16:creationId xmlns:a16="http://schemas.microsoft.com/office/drawing/2014/main" id="{7AD90CC3-3395-A146-3AED-F6772C40D9E2}"/>
+              </a:ext>
+            </a:extLst>
+          </p:cNvPr>
+          <p:cNvSpPr txBox="1"/>
+          <p:nvPr/>
+        </p:nvSpPr>
+        <p:spPr>
+          <a:xfrm>
+            <a:off x="140677" y="228600"/>
+            <a:ext cx="9091246" cy="1200329"/>
+          </a:xfrm>
+          <a:prstGeom prst="rect">
+            <a:avLst/>
+          </a:prstGeom>
+          <a:noFill/>
+        </p:spPr>
+        <p:txBody>
+          <a:bodyPr wrap="square" rtlCol="0">
+            <a:spAutoFit/>
+          </a:bodyPr>
+          <a:lstStyle/>
+          <a:p>
+            <a:pPr algn="ctr"/>
+            <a:r>
+              <a:rPr lang="en-US" sz="3600" b="1" dirty="0"/>
+              <a:t>A little unrelated but I think it is important</a:t>
+            </a:r>
+          </a:p>
+          <a:p>
+            <a:pPr algn="ctr"/>
+            <a:r>
+              <a:rPr lang="en-US" sz="3600" b="1" dirty="0"/>
+              <a:t>Stuff in Python.</a:t>
+            </a:r>
+          </a:p>
+        </p:txBody>
+      </p:sp>
+      <p:sp>
+        <p:nvSpPr>
+          <p:cNvPr id="5" name="TextBox 4">
+            <a:extLst>
+              <a:ext uri="{FF2B5EF4-FFF2-40B4-BE49-F238E27FC236}">
+                <a16:creationId xmlns:a16="http://schemas.microsoft.com/office/drawing/2014/main" id="{4E92148A-0AED-05C8-0D23-9A3C8C6E1B9C}"/>
+              </a:ext>
+            </a:extLst>
+          </p:cNvPr>
+          <p:cNvSpPr txBox="1"/>
+          <p:nvPr/>
+        </p:nvSpPr>
+        <p:spPr>
+          <a:xfrm>
+            <a:off x="277251" y="4090926"/>
+            <a:ext cx="4523349" cy="2893100"/>
+          </a:xfrm>
+          <a:prstGeom prst="rect">
+            <a:avLst/>
+          </a:prstGeom>
+          <a:noFill/>
+        </p:spPr>
+        <p:txBody>
+          <a:bodyPr wrap="square" rtlCol="0">
+            <a:spAutoFit/>
+          </a:bodyPr>
+          <a:lstStyle/>
+          <a:p>
+            <a:r>
+              <a:rPr lang="en-US" sz="2000" b="1" dirty="0"/>
+              <a:t>The **</a:t>
+            </a:r>
+            <a:r>
+              <a:rPr lang="en-US" sz="2000" b="1" dirty="0" err="1"/>
+              <a:t>kwargs</a:t>
+            </a:r>
+            <a:r>
+              <a:rPr lang="en-US" dirty="0"/>
+              <a:t>. This functions like a </a:t>
+            </a:r>
+            <a:r>
+              <a:rPr lang="en-US" dirty="0" err="1"/>
+              <a:t>json</a:t>
+            </a:r>
+            <a:r>
+              <a:rPr lang="en-US" dirty="0"/>
+              <a:t> file.</a:t>
+            </a:r>
+          </a:p>
+          <a:p>
+            <a:r>
+              <a:rPr lang="en-US" dirty="0" err="1"/>
+              <a:t>Cái</a:t>
+            </a:r>
+            <a:r>
+              <a:rPr lang="en-US" dirty="0"/>
+              <a:t> </a:t>
+            </a:r>
+            <a:r>
+              <a:rPr lang="en-US" dirty="0" err="1"/>
+              <a:t>này</a:t>
+            </a:r>
+            <a:r>
+              <a:rPr lang="en-US" dirty="0"/>
+              <a:t> </a:t>
+            </a:r>
+            <a:r>
+              <a:rPr lang="en-US" dirty="0" err="1"/>
+              <a:t>được</a:t>
+            </a:r>
+            <a:r>
+              <a:rPr lang="en-US" dirty="0"/>
+              <a:t> dung </a:t>
+            </a:r>
+            <a:r>
+              <a:rPr lang="en-US" dirty="0" err="1"/>
+              <a:t>khi</a:t>
+            </a:r>
+            <a:r>
+              <a:rPr lang="en-US" dirty="0"/>
+              <a:t> </a:t>
+            </a:r>
+            <a:r>
+              <a:rPr lang="en-US" dirty="0" err="1"/>
+              <a:t>cần</a:t>
+            </a:r>
+            <a:r>
+              <a:rPr lang="en-US" dirty="0"/>
+              <a:t> </a:t>
+            </a:r>
+            <a:r>
+              <a:rPr lang="en-US" dirty="0" err="1"/>
+              <a:t>truyền</a:t>
+            </a:r>
+            <a:r>
+              <a:rPr lang="en-US" dirty="0"/>
+              <a:t> </a:t>
+            </a:r>
+            <a:r>
+              <a:rPr lang="en-US" dirty="0" err="1"/>
+              <a:t>vào</a:t>
+            </a:r>
+            <a:r>
+              <a:rPr lang="en-US" dirty="0"/>
+              <a:t> </a:t>
+            </a:r>
+            <a:r>
+              <a:rPr lang="en-US" dirty="0" err="1"/>
+              <a:t>hàm</a:t>
+            </a:r>
+            <a:r>
+              <a:rPr lang="en-US" dirty="0"/>
+              <a:t> </a:t>
+            </a:r>
+            <a:r>
+              <a:rPr lang="en-US" dirty="0" err="1"/>
+              <a:t>số</a:t>
+            </a:r>
+            <a:r>
+              <a:rPr lang="en-US" dirty="0"/>
+              <a:t> </a:t>
+            </a:r>
+            <a:r>
+              <a:rPr lang="en-US" dirty="0" err="1"/>
+              <a:t>lượng</a:t>
+            </a:r>
+            <a:r>
+              <a:rPr lang="en-US" dirty="0"/>
+              <a:t> </a:t>
+            </a:r>
+            <a:r>
+              <a:rPr lang="en-US" dirty="0" err="1"/>
+              <a:t>biến</a:t>
+            </a:r>
+            <a:r>
+              <a:rPr lang="en-US" dirty="0"/>
+              <a:t> </a:t>
+            </a:r>
+            <a:r>
+              <a:rPr lang="en-US" dirty="0" err="1"/>
+              <a:t>chưa</a:t>
+            </a:r>
+            <a:r>
+              <a:rPr lang="en-US" dirty="0"/>
+              <a:t> </a:t>
+            </a:r>
+            <a:r>
+              <a:rPr lang="en-US" dirty="0" err="1"/>
+              <a:t>biết</a:t>
+            </a:r>
+            <a:r>
+              <a:rPr lang="en-US" dirty="0"/>
+              <a:t> </a:t>
+            </a:r>
+            <a:r>
+              <a:rPr lang="en-US" dirty="0" err="1"/>
+              <a:t>trước</a:t>
+            </a:r>
+            <a:r>
+              <a:rPr lang="en-US" dirty="0"/>
+              <a:t> </a:t>
+            </a:r>
+            <a:r>
+              <a:rPr lang="en-US" dirty="0" err="1"/>
+              <a:t>theo</a:t>
+            </a:r>
+            <a:r>
+              <a:rPr lang="en-US" dirty="0"/>
+              <a:t> </a:t>
+            </a:r>
+            <a:r>
+              <a:rPr lang="en-US" dirty="0" err="1"/>
+              <a:t>dạng</a:t>
+            </a:r>
+            <a:r>
+              <a:rPr lang="en-US" dirty="0"/>
+              <a:t> key </a:t>
+            </a:r>
+            <a:r>
+              <a:rPr lang="en-US" dirty="0" err="1"/>
+              <a:t>và</a:t>
+            </a:r>
+            <a:r>
+              <a:rPr lang="en-US" dirty="0"/>
+              <a:t> value.</a:t>
+            </a:r>
+          </a:p>
+          <a:p>
+            <a:r>
+              <a:rPr lang="en-US" dirty="0" err="1"/>
+              <a:t>Các</a:t>
+            </a:r>
+            <a:r>
+              <a:rPr lang="en-US" dirty="0"/>
+              <a:t> </a:t>
+            </a:r>
+            <a:r>
+              <a:rPr lang="en-US" dirty="0" err="1"/>
+              <a:t>cách</a:t>
+            </a:r>
+            <a:r>
+              <a:rPr lang="en-US" dirty="0"/>
+              <a:t> dung </a:t>
+            </a:r>
+            <a:r>
+              <a:rPr lang="en-US" dirty="0" err="1"/>
+              <a:t>kiểu</a:t>
+            </a:r>
+            <a:r>
+              <a:rPr lang="en-US" dirty="0"/>
+              <a:t> </a:t>
+            </a:r>
+            <a:r>
+              <a:rPr lang="en-US" dirty="0" err="1"/>
+              <a:t>truyền</a:t>
+            </a:r>
+            <a:r>
+              <a:rPr lang="en-US" dirty="0"/>
+              <a:t> </a:t>
+            </a:r>
+            <a:r>
+              <a:rPr lang="en-US" dirty="0" err="1"/>
+              <a:t>biến</a:t>
+            </a:r>
+            <a:r>
+              <a:rPr lang="en-US" dirty="0"/>
+              <a:t> </a:t>
+            </a:r>
+            <a:r>
+              <a:rPr lang="en-US" dirty="0" err="1"/>
+              <a:t>này</a:t>
+            </a:r>
+            <a:r>
+              <a:rPr lang="en-US" dirty="0"/>
+              <a:t> </a:t>
+            </a:r>
+            <a:r>
+              <a:rPr lang="en-US" dirty="0" err="1"/>
+              <a:t>được</a:t>
+            </a:r>
+            <a:r>
+              <a:rPr lang="en-US" dirty="0"/>
+              <a:t> </a:t>
+            </a:r>
+            <a:r>
+              <a:rPr lang="en-US" dirty="0" err="1"/>
+              <a:t>miêu</a:t>
+            </a:r>
+            <a:r>
+              <a:rPr lang="en-US" dirty="0"/>
+              <a:t> </a:t>
+            </a:r>
+            <a:r>
+              <a:rPr lang="en-US" dirty="0" err="1"/>
+              <a:t>tả</a:t>
+            </a:r>
+            <a:r>
+              <a:rPr lang="en-US" dirty="0"/>
+              <a:t> </a:t>
+            </a:r>
+            <a:r>
+              <a:rPr lang="en-US" dirty="0" err="1"/>
+              <a:t>như</a:t>
+            </a:r>
+            <a:r>
+              <a:rPr lang="en-US" dirty="0"/>
+              <a:t> </a:t>
+            </a:r>
+            <a:r>
+              <a:rPr lang="en-US" dirty="0" err="1"/>
+              <a:t>kế</a:t>
+            </a:r>
+            <a:r>
+              <a:rPr lang="en-US" dirty="0"/>
+              <a:t> </a:t>
+            </a:r>
+            <a:r>
+              <a:rPr lang="en-US" dirty="0" err="1"/>
+              <a:t>bên</a:t>
+            </a:r>
+            <a:r>
+              <a:rPr lang="en-US" dirty="0"/>
+              <a:t>.</a:t>
+            </a:r>
+          </a:p>
+          <a:p>
+            <a:endParaRPr lang="en-US" dirty="0"/>
+          </a:p>
+          <a:p>
+            <a:r>
+              <a:rPr lang="en-US" dirty="0" err="1"/>
+              <a:t>Dùng</a:t>
+            </a:r>
+            <a:r>
+              <a:rPr lang="en-US" dirty="0"/>
+              <a:t> </a:t>
+            </a:r>
+            <a:r>
+              <a:rPr lang="en-US" dirty="0" err="1"/>
+              <a:t>để</a:t>
+            </a:r>
+            <a:r>
+              <a:rPr lang="en-US" dirty="0"/>
+              <a:t> </a:t>
+            </a:r>
+            <a:r>
+              <a:rPr lang="en-US" dirty="0" err="1"/>
+              <a:t>truyền</a:t>
+            </a:r>
+            <a:r>
+              <a:rPr lang="en-US" dirty="0"/>
+              <a:t> key </a:t>
+            </a:r>
+            <a:r>
+              <a:rPr lang="en-US" dirty="0" err="1"/>
+              <a:t>và</a:t>
+            </a:r>
+            <a:r>
+              <a:rPr lang="en-US" dirty="0"/>
+              <a:t> value </a:t>
+            </a:r>
+            <a:r>
+              <a:rPr lang="en-US" dirty="0" err="1"/>
+              <a:t>giống</a:t>
+            </a:r>
+            <a:r>
+              <a:rPr lang="en-US" dirty="0"/>
+              <a:t> </a:t>
+            </a:r>
+            <a:r>
+              <a:rPr lang="en-US" dirty="0" err="1"/>
+              <a:t>như</a:t>
+            </a:r>
+            <a:r>
+              <a:rPr lang="en-US" dirty="0"/>
+              <a:t> </a:t>
+            </a:r>
+            <a:r>
+              <a:rPr lang="en-US" dirty="0" err="1"/>
+              <a:t>json</a:t>
+            </a:r>
+            <a:r>
+              <a:rPr lang="en-US" dirty="0"/>
+              <a:t>. </a:t>
+            </a:r>
+            <a:r>
+              <a:rPr lang="en-US" dirty="0" err="1"/>
+              <a:t>Ví</a:t>
+            </a:r>
+            <a:r>
+              <a:rPr lang="en-US" dirty="0"/>
+              <a:t> </a:t>
+            </a:r>
+            <a:r>
+              <a:rPr lang="en-US" dirty="0" err="1"/>
+              <a:t>dụ</a:t>
+            </a:r>
+            <a:r>
+              <a:rPr lang="en-US" dirty="0"/>
+              <a:t> </a:t>
+            </a:r>
+            <a:r>
+              <a:rPr lang="en-US" dirty="0" err="1"/>
+              <a:t>như</a:t>
+            </a:r>
+            <a:r>
+              <a:rPr lang="en-US" dirty="0"/>
+              <a:t> ở </a:t>
+            </a:r>
+            <a:r>
+              <a:rPr lang="en-US" dirty="0" err="1"/>
+              <a:t>kế</a:t>
+            </a:r>
+            <a:r>
+              <a:rPr lang="en-US" dirty="0"/>
+              <a:t> </a:t>
+            </a:r>
+            <a:r>
+              <a:rPr lang="en-US" dirty="0" err="1"/>
+              <a:t>bên</a:t>
+            </a:r>
+            <a:r>
+              <a:rPr lang="en-US" dirty="0"/>
+              <a:t>.</a:t>
+            </a:r>
+          </a:p>
+          <a:p>
+            <a:endParaRPr lang="en-US" dirty="0"/>
+          </a:p>
+        </p:txBody>
+      </p:sp>
+      <p:pic>
+        <p:nvPicPr>
+          <p:cNvPr id="8" name="Picture 7">
+            <a:extLst>
+              <a:ext uri="{FF2B5EF4-FFF2-40B4-BE49-F238E27FC236}">
+                <a16:creationId xmlns:a16="http://schemas.microsoft.com/office/drawing/2014/main" id="{778C4F73-1202-E3C1-77C6-7EB5348E19DE}"/>
+              </a:ext>
+            </a:extLst>
+          </p:cNvPr>
+          <p:cNvPicPr>
+            <a:picLocks noChangeAspect="1"/>
+          </p:cNvPicPr>
+          <p:nvPr/>
+        </p:nvPicPr>
+        <p:blipFill>
+          <a:blip r:embed="rId2"/>
+          <a:stretch>
+            <a:fillRect/>
+          </a:stretch>
+        </p:blipFill>
+        <p:spPr>
+          <a:xfrm>
+            <a:off x="5123445" y="1486510"/>
+            <a:ext cx="4055724" cy="2157551"/>
+          </a:xfrm>
+          <a:prstGeom prst="rect">
+            <a:avLst/>
+          </a:prstGeom>
+        </p:spPr>
+      </p:pic>
+      <p:pic>
+        <p:nvPicPr>
+          <p:cNvPr id="10" name="Picture 9">
+            <a:extLst>
+              <a:ext uri="{FF2B5EF4-FFF2-40B4-BE49-F238E27FC236}">
+                <a16:creationId xmlns:a16="http://schemas.microsoft.com/office/drawing/2014/main" id="{40721451-BB11-7CD9-960D-F73AEEB7A73A}"/>
+              </a:ext>
+            </a:extLst>
+          </p:cNvPr>
+          <p:cNvPicPr>
+            <a:picLocks noChangeAspect="1"/>
+          </p:cNvPicPr>
+          <p:nvPr/>
+        </p:nvPicPr>
+        <p:blipFill>
+          <a:blip r:embed="rId3"/>
+          <a:stretch>
+            <a:fillRect/>
+          </a:stretch>
+        </p:blipFill>
+        <p:spPr>
+          <a:xfrm>
+            <a:off x="5123445" y="3701642"/>
+            <a:ext cx="4055724" cy="1787369"/>
+          </a:xfrm>
+          <a:prstGeom prst="rect">
+            <a:avLst/>
+          </a:prstGeom>
+        </p:spPr>
+      </p:pic>
+      <p:pic>
+        <p:nvPicPr>
+          <p:cNvPr id="12" name="Picture 11">
+            <a:extLst>
+              <a:ext uri="{FF2B5EF4-FFF2-40B4-BE49-F238E27FC236}">
+                <a16:creationId xmlns:a16="http://schemas.microsoft.com/office/drawing/2014/main" id="{DCC7C6F5-C869-CB91-3806-8F54F304A4BD}"/>
+              </a:ext>
+            </a:extLst>
+          </p:cNvPr>
+          <p:cNvPicPr>
+            <a:picLocks noChangeAspect="1"/>
+          </p:cNvPicPr>
+          <p:nvPr/>
+        </p:nvPicPr>
+        <p:blipFill>
+          <a:blip r:embed="rId4"/>
+          <a:stretch>
+            <a:fillRect/>
+          </a:stretch>
+        </p:blipFill>
+        <p:spPr>
+          <a:xfrm>
+            <a:off x="5123444" y="5537476"/>
+            <a:ext cx="4378569" cy="1819746"/>
+          </a:xfrm>
+          <a:prstGeom prst="rect">
+            <a:avLst/>
+          </a:prstGeom>
+        </p:spPr>
+      </p:pic>
+      <p:sp>
+        <p:nvSpPr>
+          <p:cNvPr id="13" name="TextBox 12">
+            <a:extLst>
+              <a:ext uri="{FF2B5EF4-FFF2-40B4-BE49-F238E27FC236}">
+                <a16:creationId xmlns:a16="http://schemas.microsoft.com/office/drawing/2014/main" id="{BD4A1A00-701A-612E-9DA6-C6FC15E203FB}"/>
+              </a:ext>
+            </a:extLst>
+          </p:cNvPr>
+          <p:cNvSpPr txBox="1"/>
+          <p:nvPr/>
+        </p:nvSpPr>
+        <p:spPr>
+          <a:xfrm>
+            <a:off x="9326880" y="2231291"/>
+            <a:ext cx="2580640" cy="646331"/>
+          </a:xfrm>
+          <a:prstGeom prst="rect">
+            <a:avLst/>
+          </a:prstGeom>
+          <a:noFill/>
+        </p:spPr>
+        <p:txBody>
+          <a:bodyPr wrap="square" rtlCol="0">
+            <a:spAutoFit/>
+          </a:bodyPr>
+          <a:lstStyle/>
+          <a:p>
+            <a:r>
+              <a:rPr lang="en-US" dirty="0" err="1"/>
+              <a:t>Khai</a:t>
+            </a:r>
+            <a:r>
+              <a:rPr lang="en-US" dirty="0"/>
+              <a:t> </a:t>
+            </a:r>
+            <a:r>
+              <a:rPr lang="en-US" dirty="0" err="1"/>
+              <a:t>báo</a:t>
+            </a:r>
+            <a:r>
+              <a:rPr lang="en-US" dirty="0"/>
+              <a:t> </a:t>
+            </a:r>
+            <a:r>
+              <a:rPr lang="en-US" dirty="0" err="1"/>
+              <a:t>chấp</a:t>
+            </a:r>
+            <a:r>
+              <a:rPr lang="en-US" dirty="0"/>
+              <a:t> </a:t>
+            </a:r>
+            <a:r>
+              <a:rPr lang="en-US" dirty="0" err="1"/>
+              <a:t>nhận</a:t>
+            </a:r>
+            <a:r>
+              <a:rPr lang="en-US" dirty="0"/>
+              <a:t> </a:t>
+            </a:r>
+            <a:r>
+              <a:rPr lang="en-US" dirty="0" err="1"/>
+              <a:t>kiểu</a:t>
+            </a:r>
+            <a:r>
+              <a:rPr lang="en-US" dirty="0"/>
+              <a:t> </a:t>
+            </a:r>
+            <a:r>
+              <a:rPr lang="en-US" dirty="0" err="1"/>
+              <a:t>truyền</a:t>
+            </a:r>
+            <a:r>
+              <a:rPr lang="en-US" dirty="0"/>
+              <a:t> **</a:t>
+            </a:r>
+            <a:r>
+              <a:rPr lang="en-US" dirty="0" err="1"/>
+              <a:t>kwargs</a:t>
+            </a:r>
+            <a:endParaRPr lang="en-US" dirty="0"/>
+          </a:p>
+        </p:txBody>
+      </p:sp>
+      <p:sp>
+        <p:nvSpPr>
+          <p:cNvPr id="14" name="TextBox 13">
+            <a:extLst>
+              <a:ext uri="{FF2B5EF4-FFF2-40B4-BE49-F238E27FC236}">
+                <a16:creationId xmlns:a16="http://schemas.microsoft.com/office/drawing/2014/main" id="{CA94B812-EA43-F1F2-5531-F70CB3CF5105}"/>
+              </a:ext>
+            </a:extLst>
+          </p:cNvPr>
+          <p:cNvSpPr txBox="1"/>
+          <p:nvPr/>
+        </p:nvSpPr>
+        <p:spPr>
+          <a:xfrm>
+            <a:off x="9326880" y="4108687"/>
+            <a:ext cx="2405507" cy="646331"/>
+          </a:xfrm>
+          <a:prstGeom prst="rect">
+            <a:avLst/>
+          </a:prstGeom>
+          <a:noFill/>
+        </p:spPr>
+        <p:txBody>
+          <a:bodyPr wrap="square" rtlCol="0">
+            <a:spAutoFit/>
+          </a:bodyPr>
+          <a:lstStyle/>
+          <a:p>
+            <a:r>
+              <a:rPr lang="en-US" dirty="0" err="1"/>
+              <a:t>Truyền</a:t>
+            </a:r>
+            <a:r>
+              <a:rPr lang="en-US" dirty="0"/>
+              <a:t> </a:t>
+            </a:r>
+            <a:r>
+              <a:rPr lang="en-US" dirty="0" err="1"/>
+              <a:t>biến</a:t>
+            </a:r>
+            <a:r>
+              <a:rPr lang="en-US" dirty="0"/>
+              <a:t> </a:t>
+            </a:r>
+            <a:r>
+              <a:rPr lang="en-US" dirty="0" err="1"/>
+              <a:t>kiểu</a:t>
+            </a:r>
+            <a:r>
+              <a:rPr lang="en-US" dirty="0"/>
+              <a:t> </a:t>
+            </a:r>
+            <a:r>
+              <a:rPr lang="en-US" dirty="0" err="1"/>
+              <a:t>kwargs</a:t>
+            </a:r>
+            <a:r>
+              <a:rPr lang="en-US" dirty="0"/>
+              <a:t> </a:t>
+            </a:r>
+            <a:r>
+              <a:rPr lang="en-US" dirty="0" err="1"/>
+              <a:t>vào</a:t>
+            </a:r>
+            <a:r>
+              <a:rPr lang="en-US" dirty="0"/>
+              <a:t> </a:t>
+            </a:r>
+            <a:r>
+              <a:rPr lang="en-US" dirty="0" err="1"/>
+              <a:t>hàm</a:t>
+            </a:r>
+            <a:endParaRPr lang="en-US" dirty="0"/>
+          </a:p>
+        </p:txBody>
+      </p:sp>
+      <p:sp>
+        <p:nvSpPr>
+          <p:cNvPr id="15" name="TextBox 14">
+            <a:extLst>
+              <a:ext uri="{FF2B5EF4-FFF2-40B4-BE49-F238E27FC236}">
+                <a16:creationId xmlns:a16="http://schemas.microsoft.com/office/drawing/2014/main" id="{07CD7312-6D61-D912-E64E-B6C7DC904906}"/>
+              </a:ext>
+            </a:extLst>
+          </p:cNvPr>
+          <p:cNvSpPr txBox="1"/>
+          <p:nvPr/>
+        </p:nvSpPr>
+        <p:spPr>
+          <a:xfrm>
+            <a:off x="9672320" y="6024880"/>
+            <a:ext cx="2235200" cy="646331"/>
+          </a:xfrm>
+          <a:prstGeom prst="rect">
+            <a:avLst/>
+          </a:prstGeom>
+          <a:noFill/>
+        </p:spPr>
+        <p:txBody>
+          <a:bodyPr wrap="square" rtlCol="0">
+            <a:spAutoFit/>
+          </a:bodyPr>
+          <a:lstStyle/>
+          <a:p>
+            <a:r>
+              <a:rPr lang="en-US" dirty="0" err="1"/>
+              <a:t>Truy</a:t>
+            </a:r>
+            <a:r>
+              <a:rPr lang="en-US" dirty="0"/>
+              <a:t> </a:t>
+            </a:r>
+            <a:r>
+              <a:rPr lang="en-US" dirty="0" err="1"/>
+              <a:t>xuất</a:t>
+            </a:r>
+            <a:r>
+              <a:rPr lang="en-US" dirty="0"/>
+              <a:t> </a:t>
+            </a:r>
+            <a:r>
+              <a:rPr lang="en-US" dirty="0" err="1"/>
+              <a:t>giá</a:t>
+            </a:r>
+            <a:r>
+              <a:rPr lang="en-US" dirty="0"/>
+              <a:t> </a:t>
+            </a:r>
+            <a:r>
+              <a:rPr lang="en-US" dirty="0" err="1"/>
+              <a:t>trị</a:t>
+            </a:r>
+            <a:r>
+              <a:rPr lang="en-US" dirty="0"/>
+              <a:t> </a:t>
+            </a:r>
+            <a:r>
+              <a:rPr lang="en-US" dirty="0" err="1"/>
+              <a:t>của</a:t>
+            </a:r>
+            <a:r>
+              <a:rPr lang="en-US" dirty="0"/>
+              <a:t> </a:t>
+            </a:r>
+            <a:r>
+              <a:rPr lang="en-US" dirty="0" err="1"/>
+              <a:t>kwarg</a:t>
+            </a:r>
+            <a:r>
+              <a:rPr lang="en-US" dirty="0"/>
+              <a:t> ở </a:t>
+            </a:r>
+            <a:r>
+              <a:rPr lang="en-US" dirty="0" err="1"/>
+              <a:t>trong</a:t>
+            </a:r>
+            <a:r>
+              <a:rPr lang="en-US" dirty="0"/>
+              <a:t> </a:t>
+            </a:r>
+            <a:r>
+              <a:rPr lang="en-US" dirty="0" err="1"/>
+              <a:t>hàm</a:t>
+            </a:r>
+            <a:endParaRPr lang="en-US" dirty="0"/>
+          </a:p>
+        </p:txBody>
+      </p:sp>
+      <p:pic>
+        <p:nvPicPr>
+          <p:cNvPr id="17" name="Picture 16">
+            <a:extLst>
+              <a:ext uri="{FF2B5EF4-FFF2-40B4-BE49-F238E27FC236}">
+                <a16:creationId xmlns:a16="http://schemas.microsoft.com/office/drawing/2014/main" id="{870E7821-1585-895F-CDE4-C1470C23C03C}"/>
+              </a:ext>
+            </a:extLst>
+          </p:cNvPr>
+          <p:cNvPicPr>
+            <a:picLocks noChangeAspect="1"/>
+          </p:cNvPicPr>
+          <p:nvPr/>
+        </p:nvPicPr>
+        <p:blipFill>
+          <a:blip r:embed="rId5"/>
+          <a:stretch>
+            <a:fillRect/>
+          </a:stretch>
+        </p:blipFill>
+        <p:spPr>
+          <a:xfrm>
+            <a:off x="5123444" y="7448113"/>
+            <a:ext cx="4289683" cy="2568963"/>
+          </a:xfrm>
+          <a:prstGeom prst="rect">
+            <a:avLst/>
+          </a:prstGeom>
+        </p:spPr>
+      </p:pic>
+      <p:sp>
+        <p:nvSpPr>
+          <p:cNvPr id="18" name="TextBox 17">
+            <a:extLst>
+              <a:ext uri="{FF2B5EF4-FFF2-40B4-BE49-F238E27FC236}">
+                <a16:creationId xmlns:a16="http://schemas.microsoft.com/office/drawing/2014/main" id="{2C2FC573-52B3-076D-4B4D-BD9049C8C1B1}"/>
+              </a:ext>
+            </a:extLst>
+          </p:cNvPr>
+          <p:cNvSpPr txBox="1"/>
+          <p:nvPr/>
+        </p:nvSpPr>
+        <p:spPr>
+          <a:xfrm>
+            <a:off x="9502013" y="7650480"/>
+            <a:ext cx="2852547" cy="646331"/>
+          </a:xfrm>
+          <a:prstGeom prst="rect">
+            <a:avLst/>
+          </a:prstGeom>
+          <a:noFill/>
+        </p:spPr>
+        <p:txBody>
+          <a:bodyPr wrap="square" rtlCol="0">
+            <a:spAutoFit/>
+          </a:bodyPr>
+          <a:lstStyle/>
+          <a:p>
+            <a:r>
+              <a:rPr lang="en-US" dirty="0" err="1"/>
+              <a:t>Truyền</a:t>
+            </a:r>
+            <a:r>
+              <a:rPr lang="en-US" dirty="0"/>
+              <a:t> </a:t>
+            </a:r>
+            <a:r>
+              <a:rPr lang="en-US" dirty="0" err="1"/>
+              <a:t>biến</a:t>
+            </a:r>
+            <a:r>
+              <a:rPr lang="en-US" dirty="0"/>
+              <a:t> **</a:t>
+            </a:r>
+            <a:r>
+              <a:rPr lang="en-US" dirty="0" err="1"/>
+              <a:t>kwargs</a:t>
+            </a:r>
+            <a:r>
+              <a:rPr lang="en-US" dirty="0"/>
+              <a:t> </a:t>
+            </a:r>
+            <a:r>
+              <a:rPr lang="en-US" dirty="0" err="1"/>
+              <a:t>này</a:t>
+            </a:r>
+            <a:r>
+              <a:rPr lang="en-US" dirty="0"/>
+              <a:t> </a:t>
+            </a:r>
+            <a:r>
+              <a:rPr lang="en-US" dirty="0" err="1"/>
+              <a:t>vào</a:t>
+            </a:r>
+            <a:r>
+              <a:rPr lang="en-US" dirty="0"/>
+              <a:t> </a:t>
+            </a:r>
+            <a:r>
+              <a:rPr lang="en-US" dirty="0" err="1"/>
+              <a:t>một</a:t>
+            </a:r>
+            <a:r>
+              <a:rPr lang="en-US" dirty="0"/>
+              <a:t> </a:t>
+            </a:r>
+            <a:r>
+              <a:rPr lang="en-US" dirty="0" err="1"/>
+              <a:t>hàm</a:t>
+            </a:r>
+            <a:r>
+              <a:rPr lang="en-US" dirty="0"/>
+              <a:t> </a:t>
+            </a:r>
+            <a:r>
+              <a:rPr lang="en-US" dirty="0" err="1"/>
+              <a:t>khác</a:t>
+            </a:r>
+            <a:r>
+              <a:rPr lang="en-US" dirty="0"/>
+              <a:t>. </a:t>
+            </a:r>
+          </a:p>
+        </p:txBody>
+      </p:sp>
+    </p:spTree>
+    <p:extLst>
+      <p:ext uri="{BB962C8B-B14F-4D97-AF65-F5344CB8AC3E}">
+        <p14:creationId xmlns:p14="http://schemas.microsoft.com/office/powerpoint/2010/main" val="3159882731"/>
+      </p:ext>
+    </p:extLst>
+  </p:cSld>
+  <p:clrMapOvr>
+    <a:masterClrMapping/>
+  </p:clrMapOvr>
+</p:sld>
+</file>
+
+<file path=ppt/slides/slide4.xml><?xml version="1.0" encoding="utf-8"?>
+<p:sld xmlns:a="http://schemas.openxmlformats.org/drawingml/2006/main" xmlns:r="http://schemas.openxmlformats.org/officeDocument/2006/relationships" xmlns:p="http://schemas.openxmlformats.org/presentationml/2006/main">
+  <p:cSld>
+    <p:spTree>
+      <p:nvGrpSpPr>
+        <p:cNvPr id="1" name=""/>
+        <p:cNvGrpSpPr/>
+        <p:nvPr/>
+      </p:nvGrpSpPr>
+      <p:grpSpPr>
+        <a:xfrm>
+          <a:off x="0" y="0"/>
+          <a:ext cx="0" cy="0"/>
+          <a:chOff x="0" y="0"/>
+          <a:chExt cx="0" cy="0"/>
+        </a:xfrm>
+      </p:grpSpPr>
+      <p:sp>
+        <p:nvSpPr>
+          <p:cNvPr id="4" name="TextBox 3">
+            <a:extLst>
+              <a:ext uri="{FF2B5EF4-FFF2-40B4-BE49-F238E27FC236}">
+                <a16:creationId xmlns:a16="http://schemas.microsoft.com/office/drawing/2014/main" id="{0B6F8E52-215F-D721-DFDA-F2C5E550C952}"/>
+              </a:ext>
+            </a:extLst>
+          </p:cNvPr>
+          <p:cNvSpPr txBox="1"/>
+          <p:nvPr/>
+        </p:nvSpPr>
+        <p:spPr>
+          <a:xfrm>
+            <a:off x="281354" y="263769"/>
+            <a:ext cx="4892626" cy="5170646"/>
+          </a:xfrm>
+          <a:prstGeom prst="rect">
+            <a:avLst/>
+          </a:prstGeom>
+          <a:noFill/>
+        </p:spPr>
+        <p:txBody>
+          <a:bodyPr wrap="square" rtlCol="0">
+            <a:spAutoFit/>
+          </a:bodyPr>
+          <a:lstStyle/>
+          <a:p>
+            <a:r>
+              <a:rPr lang="en-US" sz="2400" b="1" dirty="0" err="1"/>
+              <a:t>Hàm</a:t>
+            </a:r>
+            <a:r>
+              <a:rPr lang="en-US" sz="2400" b="1" dirty="0"/>
+              <a:t> </a:t>
+            </a:r>
+            <a:r>
+              <a:rPr lang="en-US" sz="2400" b="1" dirty="0" err="1"/>
+              <a:t>khởi</a:t>
+            </a:r>
+            <a:r>
+              <a:rPr lang="en-US" sz="2400" b="1" dirty="0"/>
+              <a:t> </a:t>
+            </a:r>
+            <a:r>
+              <a:rPr lang="en-US" sz="2400" b="1" dirty="0" err="1"/>
+              <a:t>tạo</a:t>
+            </a:r>
+            <a:r>
+              <a:rPr lang="en-US" sz="2400" b="1" dirty="0"/>
+              <a:t> class: __</a:t>
+            </a:r>
+            <a:r>
+              <a:rPr lang="en-US" sz="2400" b="1" dirty="0" err="1"/>
+              <a:t>init</a:t>
+            </a:r>
+            <a:r>
+              <a:rPr lang="en-US" sz="2400" b="1" dirty="0"/>
+              <a:t>__(self):</a:t>
+            </a:r>
+          </a:p>
+          <a:p>
+            <a:endParaRPr lang="en-US" dirty="0"/>
+          </a:p>
+          <a:p>
+            <a:r>
+              <a:rPr lang="en-US" dirty="0" err="1"/>
+              <a:t>Hàm</a:t>
+            </a:r>
+            <a:r>
+              <a:rPr lang="en-US" dirty="0"/>
+              <a:t> </a:t>
+            </a:r>
+            <a:r>
+              <a:rPr lang="en-US" dirty="0" err="1"/>
+              <a:t>này</a:t>
+            </a:r>
+            <a:r>
+              <a:rPr lang="en-US" dirty="0"/>
+              <a:t> </a:t>
+            </a:r>
+            <a:r>
+              <a:rPr lang="en-US" dirty="0" err="1"/>
+              <a:t>được</a:t>
+            </a:r>
+            <a:r>
+              <a:rPr lang="en-US" dirty="0"/>
+              <a:t> </a:t>
+            </a:r>
+            <a:r>
+              <a:rPr lang="en-US" dirty="0" err="1"/>
+              <a:t>gọi</a:t>
+            </a:r>
+            <a:r>
+              <a:rPr lang="en-US" dirty="0"/>
+              <a:t> </a:t>
+            </a:r>
+            <a:r>
+              <a:rPr lang="en-US" dirty="0" err="1"/>
+              <a:t>là</a:t>
+            </a:r>
+            <a:r>
+              <a:rPr lang="en-US" dirty="0"/>
+              <a:t> </a:t>
+            </a:r>
+            <a:r>
+              <a:rPr lang="en-US" dirty="0" err="1"/>
+              <a:t>hàm</a:t>
+            </a:r>
+            <a:r>
+              <a:rPr lang="en-US" dirty="0"/>
+              <a:t> constructor. Khi </a:t>
+            </a:r>
+            <a:r>
+              <a:rPr lang="en-US" dirty="0" err="1"/>
+              <a:t>tạo</a:t>
+            </a:r>
+            <a:r>
+              <a:rPr lang="en-US" dirty="0"/>
+              <a:t> </a:t>
+            </a:r>
+            <a:r>
+              <a:rPr lang="en-US" dirty="0" err="1"/>
+              <a:t>một</a:t>
+            </a:r>
+            <a:r>
+              <a:rPr lang="en-US" dirty="0"/>
+              <a:t> instance </a:t>
+            </a:r>
+            <a:r>
+              <a:rPr lang="en-US" dirty="0" err="1"/>
+              <a:t>mới</a:t>
+            </a:r>
+            <a:r>
+              <a:rPr lang="en-US" dirty="0"/>
+              <a:t> </a:t>
+            </a:r>
+            <a:r>
+              <a:rPr lang="en-US" dirty="0" err="1"/>
+              <a:t>của</a:t>
+            </a:r>
+            <a:r>
+              <a:rPr lang="en-US" dirty="0"/>
+              <a:t> class </a:t>
+            </a:r>
+            <a:r>
+              <a:rPr lang="en-US" dirty="0" err="1"/>
+              <a:t>thì</a:t>
+            </a:r>
+            <a:r>
+              <a:rPr lang="en-US" dirty="0"/>
+              <a:t> </a:t>
+            </a:r>
+            <a:r>
+              <a:rPr lang="en-US" dirty="0" err="1"/>
+              <a:t>hàm</a:t>
+            </a:r>
+            <a:r>
+              <a:rPr lang="en-US" dirty="0"/>
+              <a:t> </a:t>
+            </a:r>
+            <a:r>
+              <a:rPr lang="en-US" dirty="0" err="1"/>
+              <a:t>này</a:t>
+            </a:r>
+            <a:r>
+              <a:rPr lang="en-US" dirty="0"/>
+              <a:t> </a:t>
+            </a:r>
+            <a:r>
+              <a:rPr lang="en-US" dirty="0" err="1"/>
+              <a:t>sẽ</a:t>
+            </a:r>
+            <a:r>
+              <a:rPr lang="en-US" dirty="0"/>
+              <a:t> </a:t>
+            </a:r>
+            <a:r>
+              <a:rPr lang="en-US" dirty="0" err="1"/>
+              <a:t>được</a:t>
+            </a:r>
+            <a:r>
+              <a:rPr lang="en-US" dirty="0"/>
+              <a:t> </a:t>
+            </a:r>
+            <a:r>
+              <a:rPr lang="en-US" dirty="0" err="1"/>
+              <a:t>chạy</a:t>
+            </a:r>
+            <a:r>
+              <a:rPr lang="en-US" dirty="0"/>
+              <a:t> </a:t>
+            </a:r>
+            <a:r>
+              <a:rPr lang="en-US" dirty="0" err="1"/>
+              <a:t>đầu</a:t>
+            </a:r>
+            <a:r>
+              <a:rPr lang="en-US" dirty="0"/>
+              <a:t> </a:t>
+            </a:r>
+            <a:r>
+              <a:rPr lang="en-US" dirty="0" err="1"/>
+              <a:t>tiên</a:t>
+            </a:r>
+            <a:r>
+              <a:rPr lang="en-US" dirty="0"/>
+              <a:t>. </a:t>
+            </a:r>
+          </a:p>
+          <a:p>
+            <a:endParaRPr lang="en-US" dirty="0"/>
+          </a:p>
+          <a:p>
+            <a:r>
+              <a:rPr lang="en-US" dirty="0"/>
+              <a:t>Khi </a:t>
+            </a:r>
+            <a:r>
+              <a:rPr lang="en-US" dirty="0" err="1"/>
+              <a:t>muốn</a:t>
+            </a:r>
+            <a:r>
+              <a:rPr lang="en-US" dirty="0"/>
+              <a:t> </a:t>
+            </a:r>
+            <a:r>
+              <a:rPr lang="en-US" dirty="0" err="1"/>
+              <a:t>truyền</a:t>
+            </a:r>
+            <a:r>
+              <a:rPr lang="en-US" dirty="0"/>
+              <a:t> </a:t>
+            </a:r>
+            <a:r>
+              <a:rPr lang="en-US" dirty="0" err="1"/>
+              <a:t>biến</a:t>
+            </a:r>
+            <a:r>
+              <a:rPr lang="en-US" dirty="0"/>
+              <a:t> </a:t>
+            </a:r>
+            <a:r>
+              <a:rPr lang="en-US" dirty="0" err="1"/>
+              <a:t>vào</a:t>
+            </a:r>
+            <a:r>
+              <a:rPr lang="en-US" dirty="0"/>
+              <a:t> instance </a:t>
+            </a:r>
+            <a:r>
+              <a:rPr lang="en-US" dirty="0" err="1"/>
+              <a:t>của</a:t>
+            </a:r>
+            <a:r>
+              <a:rPr lang="en-US" dirty="0"/>
+              <a:t> class </a:t>
+            </a:r>
+            <a:r>
+              <a:rPr lang="en-US" dirty="0" err="1"/>
+              <a:t>khi</a:t>
+            </a:r>
+            <a:r>
+              <a:rPr lang="en-US" dirty="0"/>
+              <a:t> </a:t>
+            </a:r>
+            <a:r>
+              <a:rPr lang="en-US" dirty="0" err="1"/>
+              <a:t>khởi</a:t>
+            </a:r>
+            <a:r>
+              <a:rPr lang="en-US" dirty="0"/>
+              <a:t> </a:t>
+            </a:r>
+            <a:r>
+              <a:rPr lang="en-US" dirty="0" err="1"/>
+              <a:t>chạy</a:t>
+            </a:r>
+            <a:r>
+              <a:rPr lang="en-US" dirty="0"/>
+              <a:t> </a:t>
+            </a:r>
+            <a:r>
+              <a:rPr lang="en-US" dirty="0" err="1"/>
+              <a:t>thì</a:t>
+            </a:r>
+            <a:r>
+              <a:rPr lang="en-US" dirty="0"/>
+              <a:t> </a:t>
+            </a:r>
+            <a:r>
+              <a:rPr lang="en-US" dirty="0" err="1"/>
+              <a:t>phải</a:t>
+            </a:r>
+            <a:r>
+              <a:rPr lang="en-US" dirty="0"/>
+              <a:t> </a:t>
+            </a:r>
+            <a:r>
+              <a:rPr lang="en-US" dirty="0" err="1"/>
+              <a:t>khai</a:t>
+            </a:r>
+            <a:r>
+              <a:rPr lang="en-US" dirty="0"/>
+              <a:t> </a:t>
+            </a:r>
+            <a:r>
+              <a:rPr lang="en-US" dirty="0" err="1"/>
+              <a:t>báo</a:t>
+            </a:r>
+            <a:r>
+              <a:rPr lang="en-US" dirty="0"/>
+              <a:t> </a:t>
+            </a:r>
+            <a:r>
+              <a:rPr lang="en-US" dirty="0" err="1"/>
+              <a:t>biến</a:t>
+            </a:r>
+            <a:r>
+              <a:rPr lang="en-US" dirty="0"/>
+              <a:t> </a:t>
+            </a:r>
+            <a:r>
+              <a:rPr lang="en-US" dirty="0" err="1"/>
+              <a:t>đó</a:t>
+            </a:r>
+            <a:r>
+              <a:rPr lang="en-US" dirty="0"/>
+              <a:t> ở </a:t>
+            </a:r>
+            <a:r>
+              <a:rPr lang="en-US" dirty="0" err="1"/>
+              <a:t>trong</a:t>
+            </a:r>
+            <a:r>
+              <a:rPr lang="en-US" dirty="0"/>
+              <a:t> </a:t>
+            </a:r>
+            <a:r>
+              <a:rPr lang="en-US" dirty="0" err="1"/>
+              <a:t>hàm</a:t>
+            </a:r>
+            <a:r>
+              <a:rPr lang="en-US" dirty="0"/>
+              <a:t> </a:t>
+            </a:r>
+            <a:r>
+              <a:rPr lang="en-US" dirty="0" err="1"/>
+              <a:t>này</a:t>
+            </a:r>
+            <a:endParaRPr lang="en-US" dirty="0"/>
+          </a:p>
+          <a:p>
+            <a:endParaRPr lang="en-US" dirty="0"/>
+          </a:p>
+          <a:p>
+            <a:r>
+              <a:rPr lang="en-US" dirty="0" err="1"/>
+              <a:t>Hàm</a:t>
+            </a:r>
+            <a:r>
+              <a:rPr lang="en-US" dirty="0"/>
+              <a:t> </a:t>
+            </a:r>
+            <a:r>
+              <a:rPr lang="en-US" dirty="0" err="1"/>
+              <a:t>này</a:t>
+            </a:r>
+            <a:r>
+              <a:rPr lang="en-US" dirty="0"/>
+              <a:t> </a:t>
+            </a:r>
+            <a:r>
+              <a:rPr lang="en-US" dirty="0" err="1"/>
+              <a:t>cũng</a:t>
+            </a:r>
+            <a:r>
+              <a:rPr lang="en-US" dirty="0"/>
+              <a:t> dung </a:t>
+            </a:r>
+            <a:r>
+              <a:rPr lang="en-US" dirty="0" err="1"/>
+              <a:t>để</a:t>
+            </a:r>
+            <a:r>
+              <a:rPr lang="en-US" dirty="0"/>
+              <a:t> </a:t>
+            </a:r>
+            <a:r>
+              <a:rPr lang="en-US" dirty="0" err="1"/>
+              <a:t>khởi</a:t>
+            </a:r>
+            <a:r>
+              <a:rPr lang="en-US" dirty="0"/>
+              <a:t> </a:t>
+            </a:r>
+            <a:r>
+              <a:rPr lang="en-US" dirty="0" err="1"/>
+              <a:t>tạo</a:t>
+            </a:r>
+            <a:r>
+              <a:rPr lang="en-US" dirty="0"/>
+              <a:t> </a:t>
+            </a:r>
+            <a:r>
+              <a:rPr lang="en-US" dirty="0" err="1"/>
+              <a:t>các</a:t>
+            </a:r>
+            <a:r>
+              <a:rPr lang="en-US" dirty="0"/>
+              <a:t> </a:t>
+            </a:r>
+            <a:r>
+              <a:rPr lang="en-US" dirty="0" err="1"/>
+              <a:t>biến</a:t>
+            </a:r>
+            <a:r>
+              <a:rPr lang="en-US" dirty="0"/>
+              <a:t> self. (</a:t>
+            </a:r>
+            <a:r>
+              <a:rPr lang="en-US" dirty="0" err="1"/>
+              <a:t>Biến</a:t>
+            </a:r>
+            <a:r>
+              <a:rPr lang="en-US" dirty="0"/>
+              <a:t> self </a:t>
+            </a:r>
+            <a:r>
+              <a:rPr lang="en-US" dirty="0" err="1"/>
+              <a:t>này</a:t>
+            </a:r>
+            <a:r>
+              <a:rPr lang="en-US" dirty="0"/>
+              <a:t> </a:t>
+            </a:r>
+            <a:r>
+              <a:rPr lang="en-US" dirty="0" err="1"/>
+              <a:t>theo</a:t>
+            </a:r>
+            <a:r>
+              <a:rPr lang="en-US" dirty="0"/>
+              <a:t> </a:t>
+            </a:r>
+            <a:r>
+              <a:rPr lang="en-US" dirty="0" err="1"/>
+              <a:t>mình</a:t>
+            </a:r>
+            <a:r>
+              <a:rPr lang="en-US" dirty="0"/>
+              <a:t> </a:t>
+            </a:r>
+            <a:r>
+              <a:rPr lang="en-US" dirty="0" err="1"/>
+              <a:t>hiểu</a:t>
+            </a:r>
+            <a:r>
+              <a:rPr lang="en-US" dirty="0"/>
+              <a:t> </a:t>
+            </a:r>
+            <a:r>
+              <a:rPr lang="en-US" dirty="0" err="1"/>
+              <a:t>là</a:t>
+            </a:r>
+            <a:r>
+              <a:rPr lang="en-US" dirty="0"/>
+              <a:t> </a:t>
+            </a:r>
+            <a:r>
+              <a:rPr lang="en-US" dirty="0" err="1"/>
+              <a:t>đang</a:t>
+            </a:r>
+            <a:r>
+              <a:rPr lang="en-US" dirty="0"/>
+              <a:t> </a:t>
+            </a:r>
+            <a:r>
+              <a:rPr lang="en-US" dirty="0" err="1"/>
+              <a:t>trỏ</a:t>
+            </a:r>
+            <a:r>
+              <a:rPr lang="en-US" dirty="0"/>
+              <a:t> </a:t>
+            </a:r>
+            <a:r>
+              <a:rPr lang="en-US" dirty="0" err="1"/>
+              <a:t>tới</a:t>
+            </a:r>
+            <a:r>
+              <a:rPr lang="en-US" dirty="0"/>
+              <a:t> </a:t>
+            </a:r>
+            <a:r>
+              <a:rPr lang="en-US" dirty="0" err="1"/>
+              <a:t>bản</a:t>
+            </a:r>
+            <a:r>
+              <a:rPr lang="en-US" dirty="0"/>
+              <a:t> </a:t>
+            </a:r>
+            <a:r>
+              <a:rPr lang="en-US" dirty="0" err="1"/>
+              <a:t>thân</a:t>
+            </a:r>
+            <a:r>
+              <a:rPr lang="en-US" dirty="0"/>
+              <a:t> </a:t>
+            </a:r>
+            <a:r>
+              <a:rPr lang="en-US" dirty="0" err="1"/>
+              <a:t>của</a:t>
+            </a:r>
+            <a:r>
+              <a:rPr lang="en-US" dirty="0"/>
+              <a:t> </a:t>
+            </a:r>
+            <a:r>
+              <a:rPr lang="en-US" dirty="0" err="1"/>
+              <a:t>cái</a:t>
+            </a:r>
+            <a:r>
+              <a:rPr lang="en-US" dirty="0"/>
+              <a:t> instance </a:t>
+            </a:r>
+            <a:r>
+              <a:rPr lang="en-US" dirty="0" err="1"/>
+              <a:t>của</a:t>
+            </a:r>
+            <a:r>
+              <a:rPr lang="en-US" dirty="0"/>
+              <a:t> </a:t>
+            </a:r>
+            <a:r>
+              <a:rPr lang="en-US" dirty="0" err="1"/>
+              <a:t>cái</a:t>
+            </a:r>
+            <a:r>
+              <a:rPr lang="en-US" dirty="0"/>
+              <a:t> class </a:t>
+            </a:r>
+            <a:r>
+              <a:rPr lang="en-US" dirty="0" err="1"/>
+              <a:t>đang</a:t>
+            </a:r>
+            <a:r>
+              <a:rPr lang="en-US" dirty="0"/>
+              <a:t> </a:t>
+            </a:r>
+            <a:r>
+              <a:rPr lang="en-US" dirty="0" err="1"/>
+              <a:t>chạy</a:t>
+            </a:r>
+            <a:r>
+              <a:rPr lang="en-US" dirty="0"/>
+              <a:t>)</a:t>
+            </a:r>
+          </a:p>
+          <a:p>
+            <a:r>
+              <a:rPr lang="en-US" dirty="0" err="1"/>
+              <a:t>Các</a:t>
+            </a:r>
+            <a:r>
+              <a:rPr lang="en-US" dirty="0"/>
+              <a:t> </a:t>
+            </a:r>
+            <a:r>
+              <a:rPr lang="en-US" dirty="0" err="1"/>
+              <a:t>hàm</a:t>
+            </a:r>
+            <a:r>
+              <a:rPr lang="en-US" dirty="0"/>
+              <a:t> (hay method) </a:t>
+            </a:r>
+            <a:r>
+              <a:rPr lang="en-US" dirty="0" err="1"/>
+              <a:t>trong</a:t>
+            </a:r>
+            <a:r>
+              <a:rPr lang="en-US" dirty="0"/>
+              <a:t> class </a:t>
+            </a:r>
+            <a:r>
+              <a:rPr lang="en-US" dirty="0" err="1"/>
+              <a:t>này</a:t>
+            </a:r>
+            <a:r>
+              <a:rPr lang="en-US" dirty="0"/>
+              <a:t> </a:t>
+            </a:r>
+            <a:r>
+              <a:rPr lang="en-US" dirty="0" err="1"/>
+              <a:t>có</a:t>
+            </a:r>
+            <a:r>
+              <a:rPr lang="en-US" dirty="0"/>
+              <a:t> </a:t>
+            </a:r>
+            <a:r>
+              <a:rPr lang="en-US" dirty="0" err="1"/>
+              <a:t>thể</a:t>
+            </a:r>
+            <a:r>
+              <a:rPr lang="en-US" dirty="0"/>
+              <a:t> </a:t>
+            </a:r>
+            <a:r>
+              <a:rPr lang="en-US" dirty="0" err="1"/>
+              <a:t>truy</a:t>
+            </a:r>
+            <a:r>
+              <a:rPr lang="en-US" dirty="0"/>
+              <a:t> </a:t>
+            </a:r>
+            <a:r>
+              <a:rPr lang="en-US" dirty="0" err="1"/>
+              <a:t>xuất</a:t>
+            </a:r>
+            <a:r>
+              <a:rPr lang="en-US" dirty="0"/>
+              <a:t> </a:t>
+            </a:r>
+            <a:r>
+              <a:rPr lang="en-US" dirty="0" err="1"/>
+              <a:t>tới</a:t>
+            </a:r>
+            <a:r>
+              <a:rPr lang="en-US" dirty="0"/>
+              <a:t> </a:t>
+            </a:r>
+            <a:r>
+              <a:rPr lang="en-US" dirty="0" err="1"/>
+              <a:t>các</a:t>
+            </a:r>
+            <a:r>
+              <a:rPr lang="en-US" dirty="0"/>
+              <a:t> </a:t>
+            </a:r>
+            <a:r>
+              <a:rPr lang="en-US" dirty="0" err="1"/>
+              <a:t>biến</a:t>
+            </a:r>
+            <a:r>
+              <a:rPr lang="en-US" dirty="0"/>
+              <a:t> global </a:t>
+            </a:r>
+            <a:r>
+              <a:rPr lang="en-US" dirty="0" err="1"/>
+              <a:t>của</a:t>
+            </a:r>
+            <a:r>
+              <a:rPr lang="en-US" dirty="0"/>
+              <a:t> class </a:t>
+            </a:r>
+            <a:r>
+              <a:rPr lang="en-US" dirty="0" err="1"/>
+              <a:t>thông</a:t>
+            </a:r>
+            <a:r>
+              <a:rPr lang="en-US" dirty="0"/>
+              <a:t> qua self. </a:t>
+            </a:r>
+          </a:p>
+          <a:p>
+            <a:endParaRPr lang="en-US" dirty="0"/>
+          </a:p>
+          <a:p>
+            <a:r>
+              <a:rPr lang="en-US" b="1" dirty="0" err="1"/>
+              <a:t>Chỉ</a:t>
+            </a:r>
+            <a:r>
+              <a:rPr lang="en-US" b="1" dirty="0"/>
+              <a:t> </a:t>
+            </a:r>
+            <a:r>
+              <a:rPr lang="en-US" b="1" dirty="0" err="1"/>
+              <a:t>được</a:t>
+            </a:r>
+            <a:r>
+              <a:rPr lang="en-US" b="1" dirty="0"/>
+              <a:t> </a:t>
+            </a:r>
+            <a:r>
+              <a:rPr lang="en-US" b="1" dirty="0" err="1"/>
+              <a:t>khởi</a:t>
+            </a:r>
+            <a:r>
+              <a:rPr lang="en-US" b="1" dirty="0"/>
+              <a:t> </a:t>
+            </a:r>
+            <a:r>
+              <a:rPr lang="en-US" b="1" dirty="0" err="1"/>
+              <a:t>tạo</a:t>
+            </a:r>
+            <a:r>
+              <a:rPr lang="en-US" b="1" dirty="0"/>
+              <a:t> </a:t>
+            </a:r>
+            <a:r>
+              <a:rPr lang="en-US" b="1" dirty="0" err="1"/>
+              <a:t>các</a:t>
+            </a:r>
+            <a:r>
+              <a:rPr lang="en-US" b="1" dirty="0"/>
+              <a:t> attribute </a:t>
+            </a:r>
+            <a:r>
+              <a:rPr lang="en-US" b="1" dirty="0" err="1"/>
+              <a:t>này</a:t>
+            </a:r>
+            <a:r>
+              <a:rPr lang="en-US" b="1" dirty="0"/>
+              <a:t> ở </a:t>
+            </a:r>
+            <a:r>
+              <a:rPr lang="en-US" b="1" dirty="0" err="1"/>
+              <a:t>hàm</a:t>
+            </a:r>
+            <a:r>
+              <a:rPr lang="en-US" b="1" dirty="0"/>
+              <a:t> __</a:t>
+            </a:r>
+            <a:r>
+              <a:rPr lang="en-US" b="1" dirty="0" err="1"/>
+              <a:t>init</a:t>
+            </a:r>
+            <a:r>
+              <a:rPr lang="en-US" b="1" dirty="0"/>
+              <a:t>__, </a:t>
+            </a:r>
+            <a:r>
+              <a:rPr lang="en-US" b="1" dirty="0" err="1"/>
+              <a:t>không</a:t>
+            </a:r>
+            <a:r>
+              <a:rPr lang="en-US" b="1" dirty="0"/>
+              <a:t> </a:t>
+            </a:r>
+            <a:r>
+              <a:rPr lang="en-US" b="1" dirty="0" err="1"/>
+              <a:t>được</a:t>
+            </a:r>
+            <a:r>
+              <a:rPr lang="en-US" b="1" dirty="0"/>
+              <a:t> </a:t>
+            </a:r>
+            <a:r>
+              <a:rPr lang="en-US" b="1" dirty="0" err="1"/>
+              <a:t>tạo</a:t>
+            </a:r>
+            <a:r>
+              <a:rPr lang="en-US" b="1" dirty="0"/>
+              <a:t> lung tung. </a:t>
+            </a:r>
+          </a:p>
+        </p:txBody>
+      </p:sp>
+      <p:pic>
+        <p:nvPicPr>
+          <p:cNvPr id="6" name="Picture 5">
+            <a:extLst>
+              <a:ext uri="{FF2B5EF4-FFF2-40B4-BE49-F238E27FC236}">
+                <a16:creationId xmlns:a16="http://schemas.microsoft.com/office/drawing/2014/main" id="{77844210-9B18-CEBC-755E-21175DD93F97}"/>
+              </a:ext>
+            </a:extLst>
+          </p:cNvPr>
+          <p:cNvPicPr>
+            <a:picLocks noChangeAspect="1"/>
+          </p:cNvPicPr>
+          <p:nvPr/>
+        </p:nvPicPr>
+        <p:blipFill>
+          <a:blip r:embed="rId2"/>
+          <a:stretch>
+            <a:fillRect/>
+          </a:stretch>
+        </p:blipFill>
+        <p:spPr>
+          <a:xfrm>
+            <a:off x="5298830" y="781131"/>
+            <a:ext cx="5724358" cy="5145108"/>
+          </a:xfrm>
+          <a:prstGeom prst="rect">
+            <a:avLst/>
+          </a:prstGeom>
+        </p:spPr>
+      </p:pic>
+      <p:cxnSp>
+        <p:nvCxnSpPr>
+          <p:cNvPr id="8" name="Straight Arrow Connector 7">
+            <a:extLst>
+              <a:ext uri="{FF2B5EF4-FFF2-40B4-BE49-F238E27FC236}">
+                <a16:creationId xmlns:a16="http://schemas.microsoft.com/office/drawing/2014/main" id="{097A965F-CA56-B619-82AB-80ACF04182EE}"/>
+              </a:ext>
+            </a:extLst>
+          </p:cNvPr>
+          <p:cNvCxnSpPr>
+            <a:cxnSpLocks/>
+          </p:cNvCxnSpPr>
+          <p:nvPr/>
+        </p:nvCxnSpPr>
+        <p:spPr>
+          <a:xfrm>
+            <a:off x="4884516" y="2395676"/>
+            <a:ext cx="2293524" cy="522784"/>
+          </a:xfrm>
+          <a:prstGeom prst="straightConnector1">
+            <a:avLst/>
+          </a:prstGeom>
+          <a:ln w="38100">
+            <a:solidFill>
+              <a:srgbClr val="FF0000"/>
+            </a:solidFill>
+            <a:tailEnd type="triangle"/>
+          </a:ln>
+        </p:spPr>
+        <p:style>
+          <a:lnRef idx="1">
+            <a:schemeClr val="accent1"/>
+          </a:lnRef>
+          <a:fillRef idx="0">
+            <a:schemeClr val="accent1"/>
+          </a:fillRef>
+          <a:effectRef idx="0">
+            <a:schemeClr val="accent1"/>
+          </a:effectRef>
+          <a:fontRef idx="minor">
+            <a:schemeClr val="tx1"/>
+          </a:fontRef>
+        </p:style>
+      </p:cxnSp>
+      <p:cxnSp>
+        <p:nvCxnSpPr>
+          <p:cNvPr id="10" name="Straight Arrow Connector 9">
+            <a:extLst>
+              <a:ext uri="{FF2B5EF4-FFF2-40B4-BE49-F238E27FC236}">
+                <a16:creationId xmlns:a16="http://schemas.microsoft.com/office/drawing/2014/main" id="{ADDDAF81-0938-9C01-9E55-8433AD8A36B2}"/>
+              </a:ext>
+            </a:extLst>
+          </p:cNvPr>
+          <p:cNvCxnSpPr/>
+          <p:nvPr/>
+        </p:nvCxnSpPr>
+        <p:spPr>
+          <a:xfrm>
+            <a:off x="4800600" y="3223260"/>
+            <a:ext cx="1181100" cy="0"/>
+          </a:xfrm>
+          <a:prstGeom prst="straightConnector1">
+            <a:avLst/>
+          </a:prstGeom>
+          <a:ln w="38100">
+            <a:solidFill>
+              <a:srgbClr val="FF0000"/>
+            </a:solidFill>
+            <a:tailEnd type="triangle"/>
+          </a:ln>
+        </p:spPr>
+        <p:style>
+          <a:lnRef idx="1">
+            <a:schemeClr val="accent1"/>
+          </a:lnRef>
+          <a:fillRef idx="0">
+            <a:schemeClr val="accent1"/>
+          </a:fillRef>
+          <a:effectRef idx="0">
+            <a:schemeClr val="accent1"/>
+          </a:effectRef>
+          <a:fontRef idx="minor">
+            <a:schemeClr val="tx1"/>
+          </a:fontRef>
+        </p:style>
+      </p:cxnSp>
+      <p:cxnSp>
+        <p:nvCxnSpPr>
+          <p:cNvPr id="11" name="Straight Arrow Connector 10">
+            <a:extLst>
+              <a:ext uri="{FF2B5EF4-FFF2-40B4-BE49-F238E27FC236}">
+                <a16:creationId xmlns:a16="http://schemas.microsoft.com/office/drawing/2014/main" id="{49EF4E50-A862-4B7C-3D40-03A1174531EC}"/>
+              </a:ext>
+            </a:extLst>
+          </p:cNvPr>
+          <p:cNvCxnSpPr>
+            <a:cxnSpLocks/>
+          </p:cNvCxnSpPr>
+          <p:nvPr/>
+        </p:nvCxnSpPr>
+        <p:spPr>
+          <a:xfrm flipV="1">
+            <a:off x="5029200" y="3528061"/>
+            <a:ext cx="1371600" cy="419099"/>
+          </a:xfrm>
+          <a:prstGeom prst="straightConnector1">
+            <a:avLst/>
+          </a:prstGeom>
+          <a:ln w="38100">
+            <a:solidFill>
+              <a:srgbClr val="FF0000"/>
+            </a:solidFill>
+            <a:tailEnd type="triangle"/>
+          </a:ln>
+        </p:spPr>
+        <p:style>
+          <a:lnRef idx="1">
+            <a:schemeClr val="accent1"/>
+          </a:lnRef>
+          <a:fillRef idx="0">
+            <a:schemeClr val="accent1"/>
+          </a:fillRef>
+          <a:effectRef idx="0">
+            <a:schemeClr val="accent1"/>
+          </a:effectRef>
+          <a:fontRef idx="minor">
+            <a:schemeClr val="tx1"/>
+          </a:fontRef>
+        </p:style>
+      </p:cxnSp>
+      <p:sp>
+        <p:nvSpPr>
+          <p:cNvPr id="14" name="TextBox 13">
+            <a:extLst>
+              <a:ext uri="{FF2B5EF4-FFF2-40B4-BE49-F238E27FC236}">
+                <a16:creationId xmlns:a16="http://schemas.microsoft.com/office/drawing/2014/main" id="{E55619E6-4D95-6D4A-BFD0-D06054743996}"/>
+              </a:ext>
+            </a:extLst>
+          </p:cNvPr>
+          <p:cNvSpPr txBox="1"/>
+          <p:nvPr/>
+        </p:nvSpPr>
+        <p:spPr>
+          <a:xfrm>
+            <a:off x="281354" y="6566800"/>
+            <a:ext cx="4747846" cy="2031325"/>
+          </a:xfrm>
+          <a:prstGeom prst="rect">
+            <a:avLst/>
+          </a:prstGeom>
+          <a:noFill/>
+        </p:spPr>
+        <p:txBody>
+          <a:bodyPr wrap="square" rtlCol="0">
+            <a:spAutoFit/>
+          </a:bodyPr>
+          <a:lstStyle/>
+          <a:p>
+            <a:r>
+              <a:rPr lang="en-US" dirty="0" err="1"/>
+              <a:t>Ví</a:t>
+            </a:r>
+            <a:r>
+              <a:rPr lang="en-US" dirty="0"/>
+              <a:t> </a:t>
+            </a:r>
+            <a:r>
+              <a:rPr lang="en-US" dirty="0" err="1"/>
+              <a:t>dụ</a:t>
+            </a:r>
+            <a:r>
+              <a:rPr lang="en-US" dirty="0"/>
+              <a:t> </a:t>
+            </a:r>
+            <a:r>
+              <a:rPr lang="en-US" dirty="0" err="1"/>
+              <a:t>của</a:t>
+            </a:r>
+            <a:r>
+              <a:rPr lang="en-US" dirty="0"/>
+              <a:t> </a:t>
+            </a:r>
+            <a:r>
+              <a:rPr lang="en-US" dirty="0" err="1"/>
+              <a:t>khởi</a:t>
+            </a:r>
+            <a:r>
+              <a:rPr lang="en-US" dirty="0"/>
+              <a:t> </a:t>
+            </a:r>
+            <a:r>
+              <a:rPr lang="en-US" dirty="0" err="1"/>
+              <a:t>tạo</a:t>
+            </a:r>
+            <a:r>
+              <a:rPr lang="en-US" dirty="0"/>
+              <a:t> class </a:t>
+            </a:r>
+            <a:r>
+              <a:rPr lang="en-US" dirty="0" err="1"/>
+              <a:t>vào</a:t>
+            </a:r>
+            <a:r>
+              <a:rPr lang="en-US" dirty="0"/>
+              <a:t> </a:t>
+            </a:r>
+            <a:r>
+              <a:rPr lang="en-US" dirty="0" err="1"/>
+              <a:t>truyền</a:t>
+            </a:r>
+            <a:r>
+              <a:rPr lang="en-US" dirty="0"/>
+              <a:t> </a:t>
+            </a:r>
+            <a:r>
+              <a:rPr lang="en-US" dirty="0" err="1"/>
+              <a:t>biến</a:t>
+            </a:r>
+            <a:r>
+              <a:rPr lang="en-US" dirty="0"/>
+              <a:t> </a:t>
+            </a:r>
+            <a:r>
+              <a:rPr lang="en-US" dirty="0" err="1"/>
+              <a:t>vào</a:t>
+            </a:r>
+            <a:r>
+              <a:rPr lang="en-US" dirty="0"/>
+              <a:t> class </a:t>
+            </a:r>
+            <a:r>
+              <a:rPr lang="en-US" dirty="0" err="1"/>
+              <a:t>này</a:t>
+            </a:r>
+            <a:r>
+              <a:rPr lang="en-US" dirty="0"/>
+              <a:t>.</a:t>
+            </a:r>
+          </a:p>
+          <a:p>
+            <a:endParaRPr lang="en-US" dirty="0"/>
+          </a:p>
+          <a:p>
+            <a:r>
+              <a:rPr lang="en-US" dirty="0" err="1"/>
+              <a:t>Khởi</a:t>
+            </a:r>
+            <a:r>
+              <a:rPr lang="en-US" dirty="0"/>
+              <a:t> </a:t>
+            </a:r>
+            <a:r>
+              <a:rPr lang="en-US" dirty="0" err="1"/>
+              <a:t>tạo</a:t>
+            </a:r>
+            <a:r>
+              <a:rPr lang="en-US" dirty="0"/>
+              <a:t> object </a:t>
+            </a:r>
+            <a:r>
+              <a:rPr lang="en-US" dirty="0" err="1"/>
+              <a:t>my_object</a:t>
+            </a:r>
+            <a:r>
+              <a:rPr lang="en-US" dirty="0"/>
+              <a:t> </a:t>
+            </a:r>
+            <a:r>
+              <a:rPr lang="en-US" dirty="0" err="1"/>
+              <a:t>là</a:t>
+            </a:r>
+            <a:r>
+              <a:rPr lang="en-US" dirty="0"/>
+              <a:t> </a:t>
+            </a:r>
+            <a:r>
+              <a:rPr lang="en-US" dirty="0" err="1"/>
+              <a:t>một</a:t>
+            </a:r>
+            <a:r>
+              <a:rPr lang="en-US" dirty="0"/>
+              <a:t> instance </a:t>
+            </a:r>
+            <a:r>
+              <a:rPr lang="en-US" dirty="0" err="1"/>
+              <a:t>của</a:t>
+            </a:r>
+            <a:r>
+              <a:rPr lang="en-US" dirty="0"/>
+              <a:t> class </a:t>
+            </a:r>
+            <a:r>
+              <a:rPr lang="en-US" dirty="0" err="1"/>
+              <a:t>MyClass</a:t>
+            </a:r>
+            <a:r>
+              <a:rPr lang="en-US" dirty="0"/>
+              <a:t>. </a:t>
+            </a:r>
+            <a:r>
+              <a:rPr lang="en-US" dirty="0" err="1"/>
+              <a:t>Truyền</a:t>
+            </a:r>
+            <a:r>
+              <a:rPr lang="en-US" dirty="0"/>
+              <a:t> </a:t>
+            </a:r>
+            <a:r>
+              <a:rPr lang="en-US" dirty="0" err="1"/>
+              <a:t>vào</a:t>
+            </a:r>
+            <a:r>
+              <a:rPr lang="en-US" dirty="0"/>
+              <a:t> My class </a:t>
+            </a:r>
+            <a:r>
+              <a:rPr lang="en-US" dirty="0" err="1"/>
+              <a:t>các</a:t>
+            </a:r>
+            <a:r>
+              <a:rPr lang="en-US" dirty="0"/>
+              <a:t> </a:t>
+            </a:r>
+            <a:r>
+              <a:rPr lang="en-US" dirty="0" err="1"/>
+              <a:t>biến</a:t>
+            </a:r>
+            <a:r>
+              <a:rPr lang="en-US" dirty="0"/>
+              <a:t> </a:t>
+            </a:r>
+            <a:r>
+              <a:rPr lang="en-US" dirty="0" err="1"/>
+              <a:t>gọi</a:t>
+            </a:r>
+            <a:r>
+              <a:rPr lang="en-US" dirty="0"/>
+              <a:t> </a:t>
+            </a:r>
+            <a:r>
+              <a:rPr lang="en-US" dirty="0" err="1"/>
+              <a:t>là</a:t>
+            </a:r>
+            <a:r>
+              <a:rPr lang="en-US" dirty="0"/>
+              <a:t> value1 </a:t>
+            </a:r>
+            <a:r>
+              <a:rPr lang="en-US" dirty="0" err="1"/>
+              <a:t>và</a:t>
+            </a:r>
+            <a:r>
+              <a:rPr lang="en-US" dirty="0"/>
+              <a:t> value2. Value1 </a:t>
+            </a:r>
+            <a:r>
+              <a:rPr lang="en-US" dirty="0" err="1"/>
+              <a:t>và</a:t>
+            </a:r>
+            <a:r>
+              <a:rPr lang="en-US" dirty="0"/>
+              <a:t> value2 </a:t>
+            </a:r>
+            <a:r>
+              <a:rPr lang="en-US" dirty="0" err="1"/>
+              <a:t>khi</a:t>
+            </a:r>
+            <a:r>
+              <a:rPr lang="en-US" dirty="0"/>
+              <a:t> </a:t>
+            </a:r>
+            <a:r>
+              <a:rPr lang="en-US" dirty="0" err="1"/>
+              <a:t>đó</a:t>
+            </a:r>
+            <a:r>
+              <a:rPr lang="en-US" dirty="0"/>
+              <a:t> </a:t>
+            </a:r>
+            <a:r>
+              <a:rPr lang="en-US" dirty="0" err="1"/>
+              <a:t>sẽ</a:t>
+            </a:r>
+            <a:r>
+              <a:rPr lang="en-US" dirty="0"/>
+              <a:t> </a:t>
+            </a:r>
+            <a:r>
+              <a:rPr lang="en-US" dirty="0" err="1"/>
+              <a:t>được</a:t>
+            </a:r>
+            <a:r>
+              <a:rPr lang="en-US" dirty="0"/>
+              <a:t> </a:t>
+            </a:r>
+            <a:r>
+              <a:rPr lang="en-US" dirty="0" err="1"/>
+              <a:t>truyền</a:t>
+            </a:r>
+            <a:r>
+              <a:rPr lang="en-US" dirty="0"/>
+              <a:t> </a:t>
+            </a:r>
+            <a:r>
+              <a:rPr lang="en-US" dirty="0" err="1"/>
+              <a:t>vào</a:t>
+            </a:r>
+            <a:r>
+              <a:rPr lang="en-US" dirty="0"/>
+              <a:t> self.attribute1 </a:t>
+            </a:r>
+            <a:r>
+              <a:rPr lang="en-US" dirty="0" err="1"/>
+              <a:t>và</a:t>
+            </a:r>
+            <a:r>
+              <a:rPr lang="en-US" dirty="0"/>
+              <a:t> self.attribute2</a:t>
+            </a:r>
+          </a:p>
+        </p:txBody>
+      </p:sp>
+      <p:pic>
+        <p:nvPicPr>
+          <p:cNvPr id="16" name="Picture 15">
+            <a:extLst>
+              <a:ext uri="{FF2B5EF4-FFF2-40B4-BE49-F238E27FC236}">
+                <a16:creationId xmlns:a16="http://schemas.microsoft.com/office/drawing/2014/main" id="{C073DDA2-9A09-5821-1ED8-F9A1EB9A92C9}"/>
+              </a:ext>
+            </a:extLst>
+          </p:cNvPr>
+          <p:cNvPicPr>
+            <a:picLocks noChangeAspect="1"/>
+          </p:cNvPicPr>
+          <p:nvPr/>
+        </p:nvPicPr>
+        <p:blipFill>
+          <a:blip r:embed="rId3"/>
+          <a:stretch>
+            <a:fillRect/>
+          </a:stretch>
+        </p:blipFill>
+        <p:spPr>
+          <a:xfrm>
+            <a:off x="5298830" y="6075885"/>
+            <a:ext cx="5724358" cy="3619437"/>
+          </a:xfrm>
+          <a:prstGeom prst="rect">
+            <a:avLst/>
+          </a:prstGeom>
+        </p:spPr>
+      </p:pic>
+    </p:spTree>
+    <p:extLst>
+      <p:ext uri="{BB962C8B-B14F-4D97-AF65-F5344CB8AC3E}">
+        <p14:creationId xmlns:p14="http://schemas.microsoft.com/office/powerpoint/2010/main" val="4126545396"/>
+      </p:ext>
+    </p:extLst>
+  </p:cSld>
+  <p:clrMapOvr>
+    <a:masterClrMapping/>
+  </p:clrMapOvr>
+</p:sld>
+</file>
+
+<file path=ppt/slides/slide5.xml><?xml version="1.0" encoding="utf-8"?>
+<p:sld xmlns:a="http://schemas.openxmlformats.org/drawingml/2006/main" xmlns:r="http://schemas.openxmlformats.org/officeDocument/2006/relationships" xmlns:p="http://schemas.openxmlformats.org/presentationml/2006/main">
+  <p:cSld>
+    <p:spTree>
+      <p:nvGrpSpPr>
+        <p:cNvPr id="1" name=""/>
+        <p:cNvGrpSpPr/>
+        <p:nvPr/>
+      </p:nvGrpSpPr>
+      <p:grpSpPr>
+        <a:xfrm>
+          <a:off x="0" y="0"/>
+          <a:ext cx="0" cy="0"/>
+          <a:chOff x="0" y="0"/>
+          <a:chExt cx="0" cy="0"/>
+        </a:xfrm>
+      </p:grpSpPr>
+      <p:sp>
+        <p:nvSpPr>
+          <p:cNvPr id="4" name="TextBox 3">
+            <a:extLst>
+              <a:ext uri="{FF2B5EF4-FFF2-40B4-BE49-F238E27FC236}">
+                <a16:creationId xmlns:a16="http://schemas.microsoft.com/office/drawing/2014/main" id="{3958BFC3-C41C-C3E1-E36A-2BB61D988F43}"/>
+              </a:ext>
+            </a:extLst>
+          </p:cNvPr>
+          <p:cNvSpPr txBox="1"/>
+          <p:nvPr/>
+        </p:nvSpPr>
+        <p:spPr>
+          <a:xfrm>
+            <a:off x="115746" y="185195"/>
+            <a:ext cx="7592993" cy="954107"/>
+          </a:xfrm>
+          <a:prstGeom prst="rect">
+            <a:avLst/>
+          </a:prstGeom>
+          <a:noFill/>
+        </p:spPr>
+        <p:txBody>
+          <a:bodyPr wrap="square" rtlCol="0">
+            <a:spAutoFit/>
+          </a:bodyPr>
+          <a:lstStyle/>
+          <a:p>
+            <a:r>
+              <a:rPr lang="en-US" sz="2800" b="1" dirty="0" err="1"/>
+              <a:t>Giải</a:t>
+            </a:r>
+            <a:r>
+              <a:rPr lang="en-US" sz="2800" b="1" dirty="0"/>
+              <a:t> </a:t>
+            </a:r>
+            <a:r>
+              <a:rPr lang="en-US" sz="2800" b="1" dirty="0" err="1"/>
+              <a:t>thích</a:t>
+            </a:r>
+            <a:r>
+              <a:rPr lang="en-US" sz="2800" b="1" dirty="0"/>
+              <a:t> </a:t>
+            </a:r>
+            <a:r>
+              <a:rPr lang="en-US" sz="2800" b="1" dirty="0" err="1"/>
+              <a:t>rõ</a:t>
+            </a:r>
+            <a:r>
+              <a:rPr lang="en-US" sz="2800" b="1" dirty="0"/>
+              <a:t> </a:t>
+            </a:r>
+            <a:r>
+              <a:rPr lang="en-US" sz="2800" b="1" dirty="0" err="1"/>
+              <a:t>hơn</a:t>
+            </a:r>
+            <a:r>
+              <a:rPr lang="en-US" sz="2800" b="1" dirty="0"/>
+              <a:t> </a:t>
+            </a:r>
+            <a:r>
+              <a:rPr lang="en-US" sz="2800" b="1" dirty="0" err="1"/>
+              <a:t>về</a:t>
+            </a:r>
+            <a:r>
+              <a:rPr lang="en-US" sz="2800" b="1" dirty="0"/>
+              <a:t> self, </a:t>
+            </a:r>
+            <a:r>
+              <a:rPr lang="en-US" sz="2800" b="1" dirty="0" err="1"/>
+              <a:t>tại</a:t>
+            </a:r>
+            <a:r>
+              <a:rPr lang="en-US" sz="2800" b="1" dirty="0"/>
+              <a:t> </a:t>
+            </a:r>
+            <a:r>
+              <a:rPr lang="en-US" sz="2800" b="1" dirty="0" err="1"/>
+              <a:t>sao</a:t>
+            </a:r>
+            <a:r>
+              <a:rPr lang="en-US" sz="2800" b="1" dirty="0"/>
+              <a:t> </a:t>
+            </a:r>
+            <a:r>
+              <a:rPr lang="en-US" sz="2800" b="1" dirty="0" err="1"/>
+              <a:t>khi</a:t>
+            </a:r>
+            <a:r>
+              <a:rPr lang="en-US" sz="2800" b="1" dirty="0"/>
+              <a:t> </a:t>
+            </a:r>
+            <a:r>
+              <a:rPr lang="en-US" sz="2800" b="1" dirty="0" err="1"/>
+              <a:t>khởi</a:t>
+            </a:r>
+            <a:r>
+              <a:rPr lang="en-US" sz="2800" b="1" dirty="0"/>
+              <a:t> </a:t>
+            </a:r>
+            <a:r>
+              <a:rPr lang="en-US" sz="2800" b="1" dirty="0" err="1"/>
+              <a:t>tạo</a:t>
+            </a:r>
+            <a:r>
+              <a:rPr lang="en-US" sz="2800" b="1" dirty="0"/>
+              <a:t> </a:t>
+            </a:r>
+            <a:r>
+              <a:rPr lang="en-US" sz="2800" b="1" dirty="0" err="1"/>
+              <a:t>hàm</a:t>
+            </a:r>
+            <a:r>
+              <a:rPr lang="en-US" sz="2800" b="1" dirty="0"/>
+              <a:t> </a:t>
+            </a:r>
+            <a:r>
+              <a:rPr lang="en-US" sz="2800" b="1" dirty="0" err="1"/>
+              <a:t>nào</a:t>
+            </a:r>
+            <a:r>
+              <a:rPr lang="en-US" sz="2800" b="1" dirty="0"/>
+              <a:t> </a:t>
+            </a:r>
+            <a:r>
+              <a:rPr lang="en-US" sz="2800" b="1" dirty="0" err="1"/>
+              <a:t>trong</a:t>
+            </a:r>
+            <a:r>
+              <a:rPr lang="en-US" sz="2800" b="1" dirty="0"/>
+              <a:t> class </a:t>
+            </a:r>
+            <a:r>
+              <a:rPr lang="en-US" sz="2800" b="1" dirty="0" err="1"/>
+              <a:t>cũng</a:t>
+            </a:r>
+            <a:r>
+              <a:rPr lang="en-US" sz="2800" b="1" dirty="0"/>
+              <a:t> </a:t>
+            </a:r>
+            <a:r>
+              <a:rPr lang="en-US" sz="2800" b="1" dirty="0" err="1"/>
+              <a:t>phải</a:t>
+            </a:r>
+            <a:r>
+              <a:rPr lang="en-US" sz="2800" b="1" dirty="0"/>
+              <a:t> </a:t>
+            </a:r>
+            <a:r>
+              <a:rPr lang="en-US" sz="2800" b="1" dirty="0" err="1"/>
+              <a:t>có</a:t>
+            </a:r>
+            <a:r>
+              <a:rPr lang="en-US" sz="2800" b="1" dirty="0"/>
+              <a:t> self </a:t>
+            </a:r>
+            <a:r>
+              <a:rPr lang="en-US" sz="2800" b="1" dirty="0" err="1"/>
+              <a:t>đứng</a:t>
+            </a:r>
+            <a:r>
+              <a:rPr lang="en-US" sz="2800" b="1" dirty="0"/>
+              <a:t> </a:t>
+            </a:r>
+            <a:r>
+              <a:rPr lang="en-US" sz="2800" b="1" dirty="0" err="1"/>
+              <a:t>đầu</a:t>
+            </a:r>
+            <a:r>
+              <a:rPr lang="en-US" sz="2800" b="1" dirty="0"/>
+              <a:t> </a:t>
+            </a:r>
+            <a:r>
+              <a:rPr lang="en-US" sz="2800" b="1" dirty="0" err="1"/>
+              <a:t>tiên</a:t>
+            </a:r>
+            <a:r>
+              <a:rPr lang="en-US" sz="2800" b="1" dirty="0"/>
+              <a:t>.</a:t>
+            </a:r>
+            <a:endParaRPr lang="en-US" b="1" dirty="0"/>
+          </a:p>
+        </p:txBody>
+      </p:sp>
+      <p:sp>
+        <p:nvSpPr>
+          <p:cNvPr id="5" name="TextBox 4">
+            <a:extLst>
+              <a:ext uri="{FF2B5EF4-FFF2-40B4-BE49-F238E27FC236}">
+                <a16:creationId xmlns:a16="http://schemas.microsoft.com/office/drawing/2014/main" id="{8F34DD9F-4B72-272A-055C-5F5376E98DBF}"/>
+              </a:ext>
+            </a:extLst>
+          </p:cNvPr>
+          <p:cNvSpPr txBox="1"/>
+          <p:nvPr/>
+        </p:nvSpPr>
+        <p:spPr>
+          <a:xfrm>
+            <a:off x="115746" y="1754368"/>
+            <a:ext cx="5162309" cy="3970318"/>
+          </a:xfrm>
+          <a:prstGeom prst="rect">
+            <a:avLst/>
+          </a:prstGeom>
+          <a:noFill/>
+        </p:spPr>
+        <p:txBody>
+          <a:bodyPr wrap="square" rtlCol="0">
+            <a:spAutoFit/>
+          </a:bodyPr>
+          <a:lstStyle/>
+          <a:p>
+            <a:r>
+              <a:rPr lang="en-US" dirty="0"/>
+              <a:t>Khi </a:t>
+            </a:r>
+            <a:r>
+              <a:rPr lang="en-US" dirty="0" err="1"/>
+              <a:t>tạo</a:t>
+            </a:r>
+            <a:r>
+              <a:rPr lang="en-US" dirty="0"/>
+              <a:t> </a:t>
+            </a:r>
+            <a:r>
+              <a:rPr lang="en-US" dirty="0" err="1"/>
+              <a:t>ra</a:t>
+            </a:r>
+            <a:r>
+              <a:rPr lang="en-US" dirty="0"/>
+              <a:t> 1 instance </a:t>
+            </a:r>
+            <a:r>
+              <a:rPr lang="en-US" dirty="0" err="1"/>
+              <a:t>mới</a:t>
+            </a:r>
+            <a:r>
+              <a:rPr lang="en-US" dirty="0"/>
+              <a:t> </a:t>
+            </a:r>
+            <a:r>
+              <a:rPr lang="en-US" dirty="0" err="1"/>
+              <a:t>của</a:t>
+            </a:r>
+            <a:r>
+              <a:rPr lang="en-US" dirty="0"/>
+              <a:t> class </a:t>
+            </a:r>
+            <a:r>
+              <a:rPr lang="en-US" dirty="0" err="1"/>
+              <a:t>và</a:t>
+            </a:r>
+            <a:r>
+              <a:rPr lang="en-US" dirty="0"/>
+              <a:t> </a:t>
+            </a:r>
+            <a:r>
+              <a:rPr lang="en-US" dirty="0" err="1"/>
+              <a:t>gọi</a:t>
+            </a:r>
+            <a:r>
+              <a:rPr lang="en-US" dirty="0"/>
+              <a:t> </a:t>
+            </a:r>
+            <a:r>
+              <a:rPr lang="en-US" dirty="0" err="1"/>
+              <a:t>hàm</a:t>
+            </a:r>
+            <a:r>
+              <a:rPr lang="en-US" dirty="0"/>
+              <a:t> </a:t>
+            </a:r>
+            <a:r>
+              <a:rPr lang="en-US" dirty="0" err="1"/>
+              <a:t>của</a:t>
+            </a:r>
+            <a:r>
+              <a:rPr lang="en-US" dirty="0"/>
+              <a:t> class </a:t>
+            </a:r>
+            <a:r>
+              <a:rPr lang="en-US" dirty="0" err="1"/>
+              <a:t>đó</a:t>
+            </a:r>
+            <a:r>
+              <a:rPr lang="en-US" dirty="0"/>
+              <a:t> </a:t>
+            </a:r>
+            <a:r>
+              <a:rPr lang="en-US" dirty="0" err="1"/>
+              <a:t>từ</a:t>
+            </a:r>
+            <a:r>
+              <a:rPr lang="en-US" dirty="0"/>
+              <a:t> instance. </a:t>
+            </a:r>
+            <a:r>
+              <a:rPr lang="en-US" dirty="0" err="1"/>
+              <a:t>Thì</a:t>
+            </a:r>
+            <a:r>
+              <a:rPr lang="en-US" dirty="0"/>
+              <a:t> </a:t>
+            </a:r>
+            <a:r>
+              <a:rPr lang="en-US" dirty="0" err="1"/>
+              <a:t>bản</a:t>
+            </a:r>
+            <a:r>
+              <a:rPr lang="en-US" dirty="0"/>
+              <a:t> </a:t>
+            </a:r>
+            <a:r>
+              <a:rPr lang="en-US" dirty="0" err="1"/>
+              <a:t>thân</a:t>
+            </a:r>
+            <a:r>
+              <a:rPr lang="en-US" dirty="0"/>
+              <a:t> instance </a:t>
+            </a:r>
+            <a:r>
+              <a:rPr lang="en-US" dirty="0" err="1"/>
+              <a:t>đó</a:t>
+            </a:r>
+            <a:r>
+              <a:rPr lang="en-US" dirty="0"/>
+              <a:t> </a:t>
+            </a:r>
+            <a:r>
+              <a:rPr lang="en-US" dirty="0" err="1"/>
+              <a:t>sẽ</a:t>
+            </a:r>
+            <a:r>
+              <a:rPr lang="en-US" dirty="0"/>
+              <a:t> </a:t>
+            </a:r>
+            <a:r>
+              <a:rPr lang="en-US" dirty="0" err="1"/>
+              <a:t>được</a:t>
+            </a:r>
+            <a:r>
+              <a:rPr lang="en-US" dirty="0"/>
+              <a:t> </a:t>
+            </a:r>
+            <a:r>
+              <a:rPr lang="en-US" dirty="0" err="1"/>
+              <a:t>coi</a:t>
+            </a:r>
+            <a:r>
+              <a:rPr lang="en-US" dirty="0"/>
+              <a:t> </a:t>
+            </a:r>
+            <a:r>
+              <a:rPr lang="en-US" dirty="0" err="1"/>
+              <a:t>là</a:t>
+            </a:r>
+            <a:r>
+              <a:rPr lang="en-US" dirty="0"/>
+              <a:t> </a:t>
+            </a:r>
+            <a:r>
+              <a:rPr lang="en-US" dirty="0" err="1"/>
+              <a:t>biến</a:t>
+            </a:r>
+            <a:r>
+              <a:rPr lang="en-US" dirty="0"/>
+              <a:t> </a:t>
+            </a:r>
+            <a:r>
+              <a:rPr lang="en-US" dirty="0" err="1"/>
+              <a:t>được</a:t>
+            </a:r>
+            <a:r>
+              <a:rPr lang="en-US" dirty="0"/>
+              <a:t> </a:t>
+            </a:r>
+            <a:r>
+              <a:rPr lang="en-US" dirty="0" err="1"/>
+              <a:t>truyền</a:t>
+            </a:r>
+            <a:r>
+              <a:rPr lang="en-US" dirty="0"/>
+              <a:t> </a:t>
+            </a:r>
+            <a:r>
+              <a:rPr lang="en-US" dirty="0" err="1"/>
+              <a:t>vào</a:t>
+            </a:r>
+            <a:r>
+              <a:rPr lang="en-US" dirty="0"/>
+              <a:t> </a:t>
+            </a:r>
+            <a:r>
+              <a:rPr lang="en-US" dirty="0" err="1"/>
+              <a:t>đầu</a:t>
+            </a:r>
+            <a:r>
+              <a:rPr lang="en-US" dirty="0"/>
+              <a:t> </a:t>
+            </a:r>
+            <a:r>
+              <a:rPr lang="en-US" dirty="0" err="1"/>
+              <a:t>tiên</a:t>
+            </a:r>
+            <a:r>
+              <a:rPr lang="en-US" dirty="0"/>
+              <a:t>.</a:t>
+            </a:r>
+          </a:p>
+          <a:p>
+            <a:endParaRPr lang="en-US" dirty="0"/>
+          </a:p>
+          <a:p>
+            <a:r>
+              <a:rPr lang="en-US" dirty="0" err="1"/>
+              <a:t>Ví</a:t>
+            </a:r>
+            <a:r>
+              <a:rPr lang="en-US" dirty="0"/>
+              <a:t> </a:t>
+            </a:r>
+            <a:r>
+              <a:rPr lang="en-US" dirty="0" err="1"/>
+              <a:t>dụ</a:t>
+            </a:r>
+            <a:r>
+              <a:rPr lang="en-US" dirty="0"/>
+              <a:t> ở </a:t>
+            </a:r>
+            <a:r>
+              <a:rPr lang="en-US" dirty="0" err="1"/>
+              <a:t>đây</a:t>
+            </a:r>
+            <a:r>
+              <a:rPr lang="en-US" dirty="0"/>
+              <a:t>, </a:t>
+            </a:r>
+            <a:r>
+              <a:rPr lang="en-US" dirty="0" err="1"/>
+              <a:t>có</a:t>
+            </a:r>
+            <a:r>
+              <a:rPr lang="en-US" dirty="0"/>
+              <a:t> class </a:t>
+            </a:r>
+            <a:r>
+              <a:rPr lang="en-US" dirty="0" err="1"/>
+              <a:t>là</a:t>
+            </a:r>
+            <a:r>
+              <a:rPr lang="en-US" dirty="0"/>
+              <a:t> </a:t>
+            </a:r>
+            <a:r>
+              <a:rPr lang="en-US" dirty="0" err="1"/>
+              <a:t>MyClass</a:t>
+            </a:r>
+            <a:r>
+              <a:rPr lang="en-US" dirty="0"/>
+              <a:t>(). Trong class </a:t>
+            </a:r>
+            <a:r>
+              <a:rPr lang="en-US" dirty="0" err="1"/>
+              <a:t>đó</a:t>
+            </a:r>
+            <a:r>
+              <a:rPr lang="en-US" dirty="0"/>
+              <a:t> </a:t>
+            </a:r>
+            <a:r>
+              <a:rPr lang="en-US" dirty="0" err="1"/>
+              <a:t>có</a:t>
+            </a:r>
+            <a:r>
+              <a:rPr lang="en-US" dirty="0"/>
+              <a:t> method </a:t>
+            </a:r>
+            <a:r>
+              <a:rPr lang="en-US" dirty="0" err="1"/>
+              <a:t>là</a:t>
+            </a:r>
+            <a:r>
+              <a:rPr lang="en-US" dirty="0"/>
+              <a:t> </a:t>
+            </a:r>
+            <a:r>
+              <a:rPr lang="en-US" dirty="0" err="1"/>
+              <a:t>my_method</a:t>
+            </a:r>
+            <a:r>
+              <a:rPr lang="en-US" dirty="0"/>
+              <a:t>()</a:t>
+            </a:r>
+          </a:p>
+          <a:p>
+            <a:endParaRPr lang="en-US" dirty="0"/>
+          </a:p>
+          <a:p>
+            <a:r>
+              <a:rPr lang="en-US" dirty="0" err="1"/>
+              <a:t>Khởi</a:t>
+            </a:r>
+            <a:r>
+              <a:rPr lang="en-US" dirty="0"/>
+              <a:t> </a:t>
+            </a:r>
+            <a:r>
+              <a:rPr lang="en-US" dirty="0" err="1"/>
+              <a:t>tạo</a:t>
+            </a:r>
+            <a:r>
+              <a:rPr lang="en-US" dirty="0"/>
+              <a:t> instance </a:t>
+            </a:r>
+            <a:r>
+              <a:rPr lang="en-US" dirty="0" err="1"/>
+              <a:t>mới</a:t>
+            </a:r>
+            <a:r>
+              <a:rPr lang="en-US" dirty="0"/>
+              <a:t> </a:t>
+            </a:r>
+            <a:r>
+              <a:rPr lang="en-US" dirty="0" err="1"/>
+              <a:t>của</a:t>
+            </a:r>
+            <a:r>
+              <a:rPr lang="en-US" dirty="0"/>
+              <a:t> class </a:t>
+            </a:r>
+            <a:r>
+              <a:rPr lang="en-US" dirty="0" err="1"/>
+              <a:t>là</a:t>
+            </a:r>
+            <a:r>
+              <a:rPr lang="en-US" dirty="0"/>
+              <a:t> </a:t>
+            </a:r>
+            <a:r>
+              <a:rPr lang="en-US" dirty="0" err="1"/>
+              <a:t>my_object</a:t>
+            </a:r>
+            <a:endParaRPr lang="en-US" dirty="0"/>
+          </a:p>
+          <a:p>
+            <a:r>
+              <a:rPr lang="en-US" dirty="0" err="1"/>
+              <a:t>Gọi</a:t>
+            </a:r>
+            <a:r>
+              <a:rPr lang="en-US" dirty="0"/>
+              <a:t> </a:t>
+            </a:r>
+            <a:r>
+              <a:rPr lang="en-US" dirty="0" err="1"/>
+              <a:t>hàm</a:t>
+            </a:r>
+            <a:r>
+              <a:rPr lang="en-US" dirty="0"/>
+              <a:t> </a:t>
+            </a:r>
+            <a:r>
+              <a:rPr lang="en-US" dirty="0" err="1"/>
+              <a:t>my_method</a:t>
+            </a:r>
+            <a:r>
+              <a:rPr lang="en-US" dirty="0"/>
+              <a:t>() </a:t>
+            </a:r>
+            <a:r>
+              <a:rPr lang="en-US" dirty="0" err="1"/>
+              <a:t>thì</a:t>
+            </a:r>
+            <a:r>
+              <a:rPr lang="en-US" dirty="0"/>
+              <a:t> </a:t>
+            </a:r>
+            <a:r>
+              <a:rPr lang="en-US" dirty="0" err="1"/>
+              <a:t>my_object</a:t>
+            </a:r>
+            <a:r>
+              <a:rPr lang="en-US" dirty="0"/>
+              <a:t>. </a:t>
+            </a:r>
+          </a:p>
+          <a:p>
+            <a:r>
+              <a:rPr lang="en-US" dirty="0"/>
+              <a:t>Khi </a:t>
+            </a:r>
+            <a:r>
+              <a:rPr lang="en-US" dirty="0" err="1"/>
+              <a:t>đó</a:t>
+            </a:r>
+            <a:r>
+              <a:rPr lang="en-US" dirty="0"/>
+              <a:t> </a:t>
+            </a:r>
+            <a:r>
+              <a:rPr lang="en-US" dirty="0" err="1"/>
+              <a:t>my_object</a:t>
+            </a:r>
+            <a:r>
+              <a:rPr lang="en-US" dirty="0"/>
+              <a:t> </a:t>
+            </a:r>
+            <a:r>
+              <a:rPr lang="en-US" dirty="0" err="1"/>
+              <a:t>sẽ</a:t>
+            </a:r>
+            <a:r>
+              <a:rPr lang="en-US" dirty="0"/>
+              <a:t> </a:t>
+            </a:r>
+            <a:r>
+              <a:rPr lang="en-US" dirty="0" err="1"/>
+              <a:t>là</a:t>
+            </a:r>
+            <a:r>
+              <a:rPr lang="en-US" dirty="0"/>
+              <a:t> </a:t>
+            </a:r>
+            <a:r>
+              <a:rPr lang="en-US" dirty="0" err="1"/>
+              <a:t>biến</a:t>
+            </a:r>
+            <a:r>
+              <a:rPr lang="en-US" dirty="0"/>
+              <a:t> </a:t>
+            </a:r>
+            <a:r>
+              <a:rPr lang="en-US" dirty="0" err="1"/>
+              <a:t>đầu</a:t>
+            </a:r>
+            <a:r>
+              <a:rPr lang="en-US" dirty="0"/>
+              <a:t> </a:t>
+            </a:r>
+            <a:r>
+              <a:rPr lang="en-US" dirty="0" err="1"/>
+              <a:t>tiên</a:t>
+            </a:r>
+            <a:r>
+              <a:rPr lang="en-US" dirty="0"/>
+              <a:t> </a:t>
+            </a:r>
+            <a:r>
+              <a:rPr lang="en-US" dirty="0" err="1"/>
+              <a:t>được</a:t>
+            </a:r>
+            <a:r>
+              <a:rPr lang="en-US" dirty="0"/>
+              <a:t> </a:t>
+            </a:r>
+            <a:r>
+              <a:rPr lang="en-US" dirty="0" err="1"/>
+              <a:t>truyền</a:t>
+            </a:r>
+            <a:r>
+              <a:rPr lang="en-US" dirty="0"/>
+              <a:t> </a:t>
+            </a:r>
+            <a:r>
+              <a:rPr lang="en-US" dirty="0" err="1"/>
+              <a:t>vào</a:t>
+            </a:r>
+            <a:r>
+              <a:rPr lang="en-US" dirty="0"/>
+              <a:t> </a:t>
+            </a:r>
+            <a:r>
+              <a:rPr lang="en-US" dirty="0" err="1"/>
+              <a:t>hàm</a:t>
+            </a:r>
+            <a:r>
+              <a:rPr lang="en-US" dirty="0"/>
+              <a:t> </a:t>
+            </a:r>
+            <a:r>
+              <a:rPr lang="en-US" dirty="0" err="1"/>
+              <a:t>my_method</a:t>
+            </a:r>
+            <a:r>
+              <a:rPr lang="en-US" dirty="0"/>
+              <a:t>().</a:t>
+            </a:r>
+          </a:p>
+          <a:p>
+            <a:endParaRPr lang="en-US" dirty="0"/>
+          </a:p>
+          <a:p>
+            <a:r>
+              <a:rPr lang="en-US" b="1" dirty="0" err="1"/>
+              <a:t>Vậy</a:t>
+            </a:r>
+            <a:r>
+              <a:rPr lang="en-US" b="1" dirty="0"/>
+              <a:t> </a:t>
+            </a:r>
+            <a:r>
+              <a:rPr lang="en-US" b="1" dirty="0" err="1"/>
+              <a:t>nên</a:t>
+            </a:r>
+            <a:r>
+              <a:rPr lang="en-US" b="1" dirty="0"/>
+              <a:t> </a:t>
+            </a:r>
+            <a:r>
+              <a:rPr lang="en-US" b="1" dirty="0" err="1"/>
+              <a:t>khi</a:t>
+            </a:r>
+            <a:r>
+              <a:rPr lang="en-US" b="1" dirty="0"/>
+              <a:t> </a:t>
+            </a:r>
+            <a:r>
+              <a:rPr lang="en-US" b="1" dirty="0" err="1"/>
+              <a:t>khai</a:t>
+            </a:r>
+            <a:r>
+              <a:rPr lang="en-US" b="1" dirty="0"/>
+              <a:t> </a:t>
+            </a:r>
+            <a:r>
+              <a:rPr lang="en-US" b="1" dirty="0" err="1"/>
+              <a:t>báo</a:t>
+            </a:r>
+            <a:r>
+              <a:rPr lang="en-US" b="1" dirty="0"/>
+              <a:t>: </a:t>
+            </a:r>
+            <a:r>
+              <a:rPr lang="en-US" b="1" dirty="0" err="1"/>
+              <a:t>my_method</a:t>
+            </a:r>
+            <a:r>
+              <a:rPr lang="en-US" b="1" dirty="0"/>
+              <a:t>(self, “</a:t>
+            </a:r>
+            <a:r>
+              <a:rPr lang="en-US" b="1" dirty="0" err="1"/>
+              <a:t>các</a:t>
+            </a:r>
+            <a:r>
+              <a:rPr lang="en-US" b="1" dirty="0"/>
+              <a:t> </a:t>
+            </a:r>
+            <a:r>
+              <a:rPr lang="en-US" b="1" dirty="0" err="1"/>
+              <a:t>biến</a:t>
+            </a:r>
+            <a:r>
+              <a:rPr lang="en-US" b="1" dirty="0"/>
+              <a:t> </a:t>
+            </a:r>
+            <a:r>
+              <a:rPr lang="en-US" b="1" dirty="0" err="1"/>
+              <a:t>còn</a:t>
+            </a:r>
+            <a:r>
+              <a:rPr lang="en-US" b="1" dirty="0"/>
+              <a:t> </a:t>
+            </a:r>
+            <a:r>
+              <a:rPr lang="en-US" b="1" dirty="0" err="1"/>
+              <a:t>lại</a:t>
+            </a:r>
+            <a:r>
+              <a:rPr lang="en-US" b="1" dirty="0"/>
+              <a:t>…”)</a:t>
+            </a:r>
+          </a:p>
+        </p:txBody>
+      </p:sp>
+      <p:pic>
+        <p:nvPicPr>
+          <p:cNvPr id="7" name="Picture 6">
+            <a:extLst>
+              <a:ext uri="{FF2B5EF4-FFF2-40B4-BE49-F238E27FC236}">
+                <a16:creationId xmlns:a16="http://schemas.microsoft.com/office/drawing/2014/main" id="{B7DBC416-D5B1-A82D-7EB1-A4A1B29A2D6E}"/>
+              </a:ext>
+            </a:extLst>
+          </p:cNvPr>
+          <p:cNvPicPr>
+            <a:picLocks noChangeAspect="1"/>
+          </p:cNvPicPr>
+          <p:nvPr/>
+        </p:nvPicPr>
+        <p:blipFill>
+          <a:blip r:embed="rId2"/>
+          <a:stretch>
+            <a:fillRect/>
+          </a:stretch>
+        </p:blipFill>
+        <p:spPr>
+          <a:xfrm>
+            <a:off x="5278055" y="1754368"/>
+            <a:ext cx="6458851" cy="3077004"/>
+          </a:xfrm>
+          <a:prstGeom prst="rect">
+            <a:avLst/>
+          </a:prstGeom>
+        </p:spPr>
+      </p:pic>
+      <p:sp>
+        <p:nvSpPr>
+          <p:cNvPr id="8" name="TextBox 7">
+            <a:extLst>
+              <a:ext uri="{FF2B5EF4-FFF2-40B4-BE49-F238E27FC236}">
+                <a16:creationId xmlns:a16="http://schemas.microsoft.com/office/drawing/2014/main" id="{1FDCD459-3588-84DA-5972-CC54130F09AD}"/>
+              </a:ext>
+            </a:extLst>
+          </p:cNvPr>
+          <p:cNvSpPr txBox="1"/>
+          <p:nvPr/>
+        </p:nvSpPr>
+        <p:spPr>
+          <a:xfrm>
+            <a:off x="0" y="6339752"/>
+            <a:ext cx="5069711" cy="2769989"/>
+          </a:xfrm>
+          <a:prstGeom prst="rect">
+            <a:avLst/>
+          </a:prstGeom>
+          <a:noFill/>
+        </p:spPr>
+        <p:txBody>
+          <a:bodyPr wrap="square" rtlCol="0">
+            <a:spAutoFit/>
+          </a:bodyPr>
+          <a:lstStyle/>
+          <a:p>
+            <a:r>
+              <a:rPr lang="en-US" sz="2400" b="1" dirty="0" err="1"/>
+              <a:t>Chức</a:t>
+            </a:r>
+            <a:r>
+              <a:rPr lang="en-US" sz="2400" b="1" dirty="0"/>
+              <a:t> </a:t>
+            </a:r>
+            <a:r>
+              <a:rPr lang="en-US" sz="2400" b="1" dirty="0" err="1"/>
+              <a:t>năng</a:t>
+            </a:r>
+            <a:r>
+              <a:rPr lang="en-US" sz="2400" b="1" dirty="0"/>
+              <a:t> </a:t>
+            </a:r>
+            <a:r>
+              <a:rPr lang="en-US" sz="2400" b="1" dirty="0" err="1"/>
+              <a:t>tạo</a:t>
+            </a:r>
+            <a:r>
+              <a:rPr lang="en-US" sz="2400" b="1" dirty="0"/>
+              <a:t> attribute global </a:t>
+            </a:r>
+            <a:r>
+              <a:rPr lang="en-US" sz="2400" b="1" dirty="0" err="1"/>
+              <a:t>của</a:t>
+            </a:r>
+            <a:r>
+              <a:rPr lang="en-US" sz="2400" b="1" dirty="0"/>
+              <a:t> self.</a:t>
+            </a:r>
+          </a:p>
+          <a:p>
+            <a:r>
+              <a:rPr lang="en-US" dirty="0"/>
+              <a:t>Self </a:t>
+            </a:r>
+            <a:r>
+              <a:rPr lang="en-US" dirty="0" err="1"/>
+              <a:t>khởi</a:t>
+            </a:r>
+            <a:r>
+              <a:rPr lang="en-US" dirty="0"/>
+              <a:t> </a:t>
+            </a:r>
+            <a:r>
+              <a:rPr lang="en-US" dirty="0" err="1"/>
+              <a:t>tạo</a:t>
+            </a:r>
+            <a:r>
+              <a:rPr lang="en-US" dirty="0"/>
+              <a:t> </a:t>
+            </a:r>
+            <a:r>
+              <a:rPr lang="en-US" dirty="0" err="1"/>
+              <a:t>một</a:t>
+            </a:r>
+            <a:r>
+              <a:rPr lang="en-US" dirty="0"/>
+              <a:t> </a:t>
+            </a:r>
+            <a:r>
+              <a:rPr lang="en-US" dirty="0" err="1"/>
+              <a:t>biến</a:t>
+            </a:r>
+            <a:r>
+              <a:rPr lang="en-US" dirty="0"/>
+              <a:t> </a:t>
+            </a:r>
+            <a:r>
+              <a:rPr lang="en-US" dirty="0" err="1"/>
+              <a:t>gọi</a:t>
+            </a:r>
+            <a:r>
+              <a:rPr lang="en-US" dirty="0"/>
+              <a:t> </a:t>
+            </a:r>
+            <a:r>
+              <a:rPr lang="en-US" dirty="0" err="1"/>
+              <a:t>là</a:t>
+            </a:r>
+            <a:r>
+              <a:rPr lang="en-US" dirty="0"/>
+              <a:t> attribute. </a:t>
+            </a:r>
+            <a:r>
+              <a:rPr lang="en-US" dirty="0" err="1"/>
+              <a:t>Biến</a:t>
+            </a:r>
+            <a:r>
+              <a:rPr lang="en-US" dirty="0"/>
+              <a:t> attribute </a:t>
+            </a:r>
+            <a:r>
+              <a:rPr lang="en-US" dirty="0" err="1"/>
+              <a:t>này</a:t>
+            </a:r>
+            <a:r>
+              <a:rPr lang="en-US" dirty="0"/>
+              <a:t> </a:t>
+            </a:r>
+            <a:r>
+              <a:rPr lang="en-US" dirty="0" err="1"/>
+              <a:t>có</a:t>
+            </a:r>
+            <a:r>
+              <a:rPr lang="en-US" dirty="0"/>
+              <a:t> </a:t>
+            </a:r>
+            <a:r>
+              <a:rPr lang="en-US" dirty="0" err="1"/>
+              <a:t>thể</a:t>
+            </a:r>
+            <a:r>
+              <a:rPr lang="en-US" dirty="0"/>
+              <a:t> </a:t>
+            </a:r>
+            <a:r>
+              <a:rPr lang="en-US" dirty="0" err="1"/>
+              <a:t>được</a:t>
+            </a:r>
+            <a:r>
+              <a:rPr lang="en-US" dirty="0"/>
+              <a:t> </a:t>
+            </a:r>
+            <a:r>
+              <a:rPr lang="en-US" dirty="0" err="1"/>
+              <a:t>truy</a:t>
+            </a:r>
+            <a:r>
+              <a:rPr lang="en-US" dirty="0"/>
+              <a:t> </a:t>
+            </a:r>
+            <a:r>
+              <a:rPr lang="en-US" dirty="0" err="1"/>
+              <a:t>cập</a:t>
+            </a:r>
+            <a:r>
+              <a:rPr lang="en-US" dirty="0"/>
+              <a:t> </a:t>
+            </a:r>
+            <a:r>
+              <a:rPr lang="en-US" dirty="0" err="1"/>
+              <a:t>tới</a:t>
+            </a:r>
+            <a:r>
+              <a:rPr lang="en-US" dirty="0"/>
+              <a:t> </a:t>
+            </a:r>
+            <a:r>
+              <a:rPr lang="en-US" dirty="0" err="1"/>
+              <a:t>bởi</a:t>
+            </a:r>
+            <a:r>
+              <a:rPr lang="en-US" dirty="0"/>
+              <a:t> </a:t>
+            </a:r>
+            <a:r>
+              <a:rPr lang="en-US" dirty="0" err="1"/>
+              <a:t>tất</a:t>
+            </a:r>
+            <a:r>
+              <a:rPr lang="en-US" dirty="0"/>
+              <a:t> </a:t>
+            </a:r>
+            <a:r>
+              <a:rPr lang="en-US" dirty="0" err="1"/>
+              <a:t>cả</a:t>
+            </a:r>
+            <a:r>
+              <a:rPr lang="en-US" dirty="0"/>
+              <a:t> </a:t>
+            </a:r>
+            <a:r>
+              <a:rPr lang="en-US" dirty="0" err="1"/>
+              <a:t>các</a:t>
+            </a:r>
+            <a:r>
+              <a:rPr lang="en-US" dirty="0"/>
+              <a:t> method </a:t>
+            </a:r>
+            <a:r>
+              <a:rPr lang="en-US" dirty="0" err="1"/>
+              <a:t>trong</a:t>
+            </a:r>
+            <a:r>
+              <a:rPr lang="en-US" dirty="0"/>
+              <a:t> </a:t>
+            </a:r>
+            <a:r>
+              <a:rPr lang="en-US" dirty="0" err="1"/>
+              <a:t>MyClass</a:t>
+            </a:r>
+            <a:r>
+              <a:rPr lang="en-US" dirty="0"/>
+              <a:t> </a:t>
+            </a:r>
+            <a:r>
+              <a:rPr lang="en-US" dirty="0" err="1"/>
+              <a:t>khi</a:t>
+            </a:r>
+            <a:r>
+              <a:rPr lang="en-US" dirty="0"/>
+              <a:t> </a:t>
+            </a:r>
+            <a:r>
+              <a:rPr lang="en-US" dirty="0" err="1"/>
+              <a:t>gọi</a:t>
+            </a:r>
+            <a:r>
+              <a:rPr lang="en-US" dirty="0"/>
+              <a:t> </a:t>
+            </a:r>
+            <a:r>
+              <a:rPr lang="en-US" dirty="0" err="1"/>
+              <a:t>self.attribute</a:t>
+            </a:r>
+            <a:r>
+              <a:rPr lang="en-US" dirty="0"/>
+              <a:t>. </a:t>
+            </a:r>
+          </a:p>
+          <a:p>
+            <a:endParaRPr lang="en-US" dirty="0"/>
+          </a:p>
+          <a:p>
+            <a:endParaRPr lang="en-US" dirty="0"/>
+          </a:p>
+          <a:p>
+            <a:r>
+              <a:rPr lang="en-US" b="1" dirty="0" err="1"/>
+              <a:t>Lưu</a:t>
+            </a:r>
+            <a:r>
+              <a:rPr lang="en-US" b="1" dirty="0"/>
+              <a:t> ý: </a:t>
+            </a:r>
+            <a:r>
+              <a:rPr lang="en-US" b="1" dirty="0" err="1"/>
+              <a:t>các</a:t>
+            </a:r>
+            <a:r>
+              <a:rPr lang="en-US" b="1" dirty="0"/>
+              <a:t> attribute </a:t>
+            </a:r>
+            <a:r>
+              <a:rPr lang="en-US" b="1" dirty="0" err="1"/>
+              <a:t>chỉ</a:t>
+            </a:r>
+            <a:r>
+              <a:rPr lang="en-US" b="1" dirty="0"/>
+              <a:t> </a:t>
+            </a:r>
+            <a:r>
+              <a:rPr lang="en-US" b="1" dirty="0" err="1"/>
+              <a:t>được</a:t>
+            </a:r>
+            <a:r>
+              <a:rPr lang="en-US" b="1" dirty="0"/>
+              <a:t> </a:t>
+            </a:r>
+            <a:r>
+              <a:rPr lang="en-US" b="1" dirty="0" err="1"/>
+              <a:t>khởi</a:t>
+            </a:r>
+            <a:r>
+              <a:rPr lang="en-US" b="1" dirty="0"/>
+              <a:t> </a:t>
+            </a:r>
+            <a:r>
+              <a:rPr lang="en-US" b="1" dirty="0" err="1"/>
+              <a:t>tạo</a:t>
+            </a:r>
+            <a:r>
+              <a:rPr lang="en-US" b="1" dirty="0"/>
+              <a:t> </a:t>
+            </a:r>
+            <a:r>
+              <a:rPr lang="en-US" b="1" dirty="0" err="1"/>
+              <a:t>duy</a:t>
+            </a:r>
+            <a:r>
+              <a:rPr lang="en-US" b="1" dirty="0"/>
+              <a:t> </a:t>
+            </a:r>
+            <a:r>
+              <a:rPr lang="en-US" b="1" dirty="0" err="1"/>
+              <a:t>nhất</a:t>
+            </a:r>
+            <a:r>
+              <a:rPr lang="en-US" b="1" dirty="0"/>
+              <a:t> </a:t>
+            </a:r>
+            <a:r>
+              <a:rPr lang="en-US" b="1" dirty="0" err="1"/>
+              <a:t>trong</a:t>
+            </a:r>
+            <a:r>
+              <a:rPr lang="en-US" b="1" dirty="0"/>
+              <a:t> __</a:t>
+            </a:r>
+            <a:r>
+              <a:rPr lang="en-US" b="1" dirty="0" err="1"/>
+              <a:t>init</a:t>
+            </a:r>
+            <a:r>
+              <a:rPr lang="en-US" b="1" dirty="0"/>
+              <a:t>__(). </a:t>
+            </a:r>
+            <a:r>
+              <a:rPr lang="en-US" b="1" dirty="0" err="1"/>
+              <a:t>Không</a:t>
+            </a:r>
+            <a:r>
+              <a:rPr lang="en-US" b="1" dirty="0"/>
+              <a:t> </a:t>
+            </a:r>
+            <a:r>
+              <a:rPr lang="en-US" b="1" dirty="0" err="1"/>
+              <a:t>được</a:t>
+            </a:r>
+            <a:r>
+              <a:rPr lang="en-US" b="1" dirty="0"/>
+              <a:t> </a:t>
+            </a:r>
+            <a:r>
+              <a:rPr lang="en-US" b="1" dirty="0" err="1"/>
+              <a:t>khởi</a:t>
+            </a:r>
+            <a:r>
+              <a:rPr lang="en-US" b="1" dirty="0"/>
+              <a:t> </a:t>
+            </a:r>
+            <a:r>
+              <a:rPr lang="en-US" b="1" dirty="0" err="1"/>
+              <a:t>tạo</a:t>
+            </a:r>
+            <a:r>
+              <a:rPr lang="en-US" b="1" dirty="0"/>
+              <a:t> lung tung. </a:t>
+            </a:r>
+          </a:p>
+        </p:txBody>
+      </p:sp>
+      <p:pic>
+        <p:nvPicPr>
+          <p:cNvPr id="10" name="Picture 9">
+            <a:extLst>
+              <a:ext uri="{FF2B5EF4-FFF2-40B4-BE49-F238E27FC236}">
+                <a16:creationId xmlns:a16="http://schemas.microsoft.com/office/drawing/2014/main" id="{6826B900-54FC-8498-924C-3DC53463D161}"/>
+              </a:ext>
+            </a:extLst>
+          </p:cNvPr>
+          <p:cNvPicPr>
+            <a:picLocks noChangeAspect="1"/>
+          </p:cNvPicPr>
+          <p:nvPr/>
+        </p:nvPicPr>
+        <p:blipFill>
+          <a:blip r:embed="rId3"/>
+          <a:stretch>
+            <a:fillRect/>
+          </a:stretch>
+        </p:blipFill>
+        <p:spPr>
+          <a:xfrm>
+            <a:off x="5278055" y="5775768"/>
+            <a:ext cx="4323145" cy="2938186"/>
+          </a:xfrm>
+          <a:prstGeom prst="rect">
+            <a:avLst/>
+          </a:prstGeom>
+        </p:spPr>
+      </p:pic>
+      <p:pic>
+        <p:nvPicPr>
+          <p:cNvPr id="12" name="Picture 11">
+            <a:extLst>
+              <a:ext uri="{FF2B5EF4-FFF2-40B4-BE49-F238E27FC236}">
+                <a16:creationId xmlns:a16="http://schemas.microsoft.com/office/drawing/2014/main" id="{4814B38C-39A5-D3E9-05E1-F7D667286EDE}"/>
+              </a:ext>
+            </a:extLst>
+          </p:cNvPr>
+          <p:cNvPicPr>
+            <a:picLocks noChangeAspect="1"/>
+          </p:cNvPicPr>
+          <p:nvPr/>
+        </p:nvPicPr>
+        <p:blipFill>
+          <a:blip r:embed="rId4"/>
+          <a:stretch>
+            <a:fillRect/>
+          </a:stretch>
+        </p:blipFill>
+        <p:spPr>
+          <a:xfrm>
+            <a:off x="5278055" y="8765036"/>
+            <a:ext cx="4350061" cy="2555005"/>
+          </a:xfrm>
+          <a:prstGeom prst="rect">
+            <a:avLst/>
+          </a:prstGeom>
+        </p:spPr>
+      </p:pic>
+    </p:spTree>
+    <p:extLst>
+      <p:ext uri="{BB962C8B-B14F-4D97-AF65-F5344CB8AC3E}">
+        <p14:creationId xmlns:p14="http://schemas.microsoft.com/office/powerpoint/2010/main" val="3890688096"/>
+      </p:ext>
+    </p:extLst>
+  </p:cSld>
+  <p:clrMapOvr>
+    <a:masterClrMapping/>
+  </p:clrMapOvr>
+</p:sld>
+</file>
+
 <file path=ppt/theme/theme1.xml><?xml version="1.0" encoding="utf-8"?>
 <a:theme xmlns:a="http://schemas.openxmlformats.org/drawingml/2006/main" name="Office Theme">
   <a:themeElements>

</xml_diff>

<commit_message>
Adding how to create custom dataset in documentation
</commit_message>
<xml_diff>
--- a/Yolov1/Documentation/Yolov1_implementation.pptx
+++ b/Yolov1/Documentation/Yolov1_implementation.pptx
@@ -10,6 +10,7 @@
     <p:sldId id="258" r:id="rId4"/>
     <p:sldId id="259" r:id="rId5"/>
     <p:sldId id="260" r:id="rId6"/>
+    <p:sldId id="261" r:id="rId7"/>
   </p:sldIdLst>
   <p:sldSz cx="9601200" cy="12801600" type="A3"/>
   <p:notesSz cx="6858000" cy="9144000"/>
@@ -15935,6 +15936,744 @@
 </p:sld>
 </file>
 
+<file path=ppt/slides/slide6.xml><?xml version="1.0" encoding="utf-8"?>
+<p:sld xmlns:a="http://schemas.openxmlformats.org/drawingml/2006/main" xmlns:r="http://schemas.openxmlformats.org/officeDocument/2006/relationships" xmlns:p="http://schemas.openxmlformats.org/presentationml/2006/main">
+  <p:cSld>
+    <p:spTree>
+      <p:nvGrpSpPr>
+        <p:cNvPr id="1" name=""/>
+        <p:cNvGrpSpPr/>
+        <p:nvPr/>
+      </p:nvGrpSpPr>
+      <p:grpSpPr>
+        <a:xfrm>
+          <a:off x="0" y="0"/>
+          <a:ext cx="0" cy="0"/>
+          <a:chOff x="0" y="0"/>
+          <a:chExt cx="0" cy="0"/>
+        </a:xfrm>
+      </p:grpSpPr>
+      <p:sp>
+        <p:nvSpPr>
+          <p:cNvPr id="4" name="TextBox 3">
+            <a:extLst>
+              <a:ext uri="{FF2B5EF4-FFF2-40B4-BE49-F238E27FC236}">
+                <a16:creationId xmlns:a16="http://schemas.microsoft.com/office/drawing/2014/main" id="{4D12EA6E-DCD9-EBD4-88A6-6A2BCD39EFE5}"/>
+              </a:ext>
+            </a:extLst>
+          </p:cNvPr>
+          <p:cNvSpPr txBox="1"/>
+          <p:nvPr/>
+        </p:nvSpPr>
+        <p:spPr>
+          <a:xfrm>
+            <a:off x="1069848" y="335280"/>
+            <a:ext cx="7461504" cy="707886"/>
+          </a:xfrm>
+          <a:prstGeom prst="rect">
+            <a:avLst/>
+          </a:prstGeom>
+          <a:noFill/>
+        </p:spPr>
+        <p:txBody>
+          <a:bodyPr wrap="square" rtlCol="0">
+            <a:spAutoFit/>
+          </a:bodyPr>
+          <a:lstStyle/>
+          <a:p>
+            <a:pPr algn="ctr"/>
+            <a:r>
+              <a:rPr lang="en-US" sz="4000" b="1" dirty="0"/>
+              <a:t>Create a custom Dataset</a:t>
+            </a:r>
+          </a:p>
+        </p:txBody>
+      </p:sp>
+      <p:sp>
+        <p:nvSpPr>
+          <p:cNvPr id="5" name="TextBox 4">
+            <a:extLst>
+              <a:ext uri="{FF2B5EF4-FFF2-40B4-BE49-F238E27FC236}">
+                <a16:creationId xmlns:a16="http://schemas.microsoft.com/office/drawing/2014/main" id="{9B1F4CD2-39D0-ED05-000A-B6116530B53A}"/>
+              </a:ext>
+            </a:extLst>
+          </p:cNvPr>
+          <p:cNvSpPr txBox="1"/>
+          <p:nvPr/>
+        </p:nvSpPr>
+        <p:spPr>
+          <a:xfrm>
+            <a:off x="579120" y="1503680"/>
+            <a:ext cx="7952232" cy="646331"/>
+          </a:xfrm>
+          <a:prstGeom prst="rect">
+            <a:avLst/>
+          </a:prstGeom>
+          <a:noFill/>
+        </p:spPr>
+        <p:txBody>
+          <a:bodyPr wrap="square" rtlCol="0">
+            <a:spAutoFit/>
+          </a:bodyPr>
+          <a:lstStyle/>
+          <a:p>
+            <a:r>
+              <a:rPr lang="en-US" dirty="0"/>
+              <a:t>I follow this tutorial from </a:t>
+            </a:r>
+            <a:r>
+              <a:rPr lang="en-US" dirty="0" err="1"/>
+              <a:t>Youtube</a:t>
+            </a:r>
+            <a:r>
+              <a:rPr lang="en-US" dirty="0"/>
+              <a:t> to create a custom dataset for yoloV1 https://www.youtube.com/watch?v=9UHGjKWuV0s</a:t>
+            </a:r>
+          </a:p>
+        </p:txBody>
+      </p:sp>
+      <p:sp>
+        <p:nvSpPr>
+          <p:cNvPr id="6" name="TextBox 5">
+            <a:extLst>
+              <a:ext uri="{FF2B5EF4-FFF2-40B4-BE49-F238E27FC236}">
+                <a16:creationId xmlns:a16="http://schemas.microsoft.com/office/drawing/2014/main" id="{0EB715C9-2033-6AA1-D906-DD592A185773}"/>
+              </a:ext>
+            </a:extLst>
+          </p:cNvPr>
+          <p:cNvSpPr txBox="1"/>
+          <p:nvPr/>
+        </p:nvSpPr>
+        <p:spPr>
+          <a:xfrm>
+            <a:off x="680720" y="2336800"/>
+            <a:ext cx="6959600" cy="369332"/>
+          </a:xfrm>
+          <a:prstGeom prst="rect">
+            <a:avLst/>
+          </a:prstGeom>
+          <a:noFill/>
+        </p:spPr>
+        <p:txBody>
+          <a:bodyPr wrap="square" rtlCol="0">
+            <a:spAutoFit/>
+          </a:bodyPr>
+          <a:lstStyle/>
+          <a:p>
+            <a:r>
+              <a:rPr lang="en-US" dirty="0"/>
+              <a:t>Use the app called </a:t>
+            </a:r>
+            <a:r>
+              <a:rPr lang="en-US" dirty="0" err="1"/>
+              <a:t>labelImg</a:t>
+            </a:r>
+            <a:r>
+              <a:rPr lang="en-US" dirty="0"/>
+              <a:t> I was able to quickly </a:t>
+            </a:r>
+            <a:r>
+              <a:rPr lang="en-US" dirty="0" err="1"/>
+              <a:t>lable</a:t>
+            </a:r>
+            <a:r>
+              <a:rPr lang="en-US" dirty="0"/>
+              <a:t> a lot of images</a:t>
+            </a:r>
+          </a:p>
+        </p:txBody>
+      </p:sp>
+      <p:pic>
+        <p:nvPicPr>
+          <p:cNvPr id="8" name="Picture 7">
+            <a:extLst>
+              <a:ext uri="{FF2B5EF4-FFF2-40B4-BE49-F238E27FC236}">
+                <a16:creationId xmlns:a16="http://schemas.microsoft.com/office/drawing/2014/main" id="{179326AA-D5F8-4680-2F9A-F7B8BAB83C67}"/>
+              </a:ext>
+            </a:extLst>
+          </p:cNvPr>
+          <p:cNvPicPr>
+            <a:picLocks noChangeAspect="1"/>
+          </p:cNvPicPr>
+          <p:nvPr/>
+        </p:nvPicPr>
+        <p:blipFill>
+          <a:blip r:embed="rId2"/>
+          <a:stretch>
+            <a:fillRect/>
+          </a:stretch>
+        </p:blipFill>
+        <p:spPr>
+          <a:xfrm>
+            <a:off x="1539240" y="2719332"/>
+            <a:ext cx="6522720" cy="347177"/>
+          </a:xfrm>
+          <a:prstGeom prst="rect">
+            <a:avLst/>
+          </a:prstGeom>
+        </p:spPr>
+      </p:pic>
+      <p:sp>
+        <p:nvSpPr>
+          <p:cNvPr id="9" name="TextBox 8">
+            <a:extLst>
+              <a:ext uri="{FF2B5EF4-FFF2-40B4-BE49-F238E27FC236}">
+                <a16:creationId xmlns:a16="http://schemas.microsoft.com/office/drawing/2014/main" id="{2C099933-5303-FC96-E668-0E692BDE893B}"/>
+              </a:ext>
+            </a:extLst>
+          </p:cNvPr>
+          <p:cNvSpPr txBox="1"/>
+          <p:nvPr/>
+        </p:nvSpPr>
+        <p:spPr>
+          <a:xfrm>
+            <a:off x="2057400" y="3312664"/>
+            <a:ext cx="5486400" cy="646331"/>
+          </a:xfrm>
+          <a:prstGeom prst="rect">
+            <a:avLst/>
+          </a:prstGeom>
+          <a:noFill/>
+        </p:spPr>
+        <p:txBody>
+          <a:bodyPr wrap="square" rtlCol="0">
+            <a:spAutoFit/>
+          </a:bodyPr>
+          <a:lstStyle/>
+          <a:p>
+            <a:r>
+              <a:rPr lang="en-US" dirty="0"/>
+              <a:t>The version I am using is quite old, this is the new version for it: https://github.com/heartexlabs/labelImg</a:t>
+            </a:r>
+          </a:p>
+        </p:txBody>
+      </p:sp>
+      <p:pic>
+        <p:nvPicPr>
+          <p:cNvPr id="11" name="Picture 10">
+            <a:extLst>
+              <a:ext uri="{FF2B5EF4-FFF2-40B4-BE49-F238E27FC236}">
+                <a16:creationId xmlns:a16="http://schemas.microsoft.com/office/drawing/2014/main" id="{5715F1DC-B0D1-C855-58D9-6540F5AD40A3}"/>
+              </a:ext>
+            </a:extLst>
+          </p:cNvPr>
+          <p:cNvPicPr>
+            <a:picLocks noChangeAspect="1"/>
+          </p:cNvPicPr>
+          <p:nvPr/>
+        </p:nvPicPr>
+        <p:blipFill>
+          <a:blip r:embed="rId3"/>
+          <a:stretch>
+            <a:fillRect/>
+          </a:stretch>
+        </p:blipFill>
+        <p:spPr>
+          <a:xfrm>
+            <a:off x="4912361" y="4025553"/>
+            <a:ext cx="1930400" cy="2065258"/>
+          </a:xfrm>
+          <a:prstGeom prst="rect">
+            <a:avLst/>
+          </a:prstGeom>
+        </p:spPr>
+      </p:pic>
+      <p:sp>
+        <p:nvSpPr>
+          <p:cNvPr id="12" name="TextBox 11">
+            <a:extLst>
+              <a:ext uri="{FF2B5EF4-FFF2-40B4-BE49-F238E27FC236}">
+                <a16:creationId xmlns:a16="http://schemas.microsoft.com/office/drawing/2014/main" id="{7633A699-C9AC-BE92-DC2C-9EBE56EF12D7}"/>
+              </a:ext>
+            </a:extLst>
+          </p:cNvPr>
+          <p:cNvSpPr txBox="1"/>
+          <p:nvPr/>
+        </p:nvSpPr>
+        <p:spPr>
+          <a:xfrm>
+            <a:off x="2758440" y="4735016"/>
+            <a:ext cx="1930400" cy="646331"/>
+          </a:xfrm>
+          <a:prstGeom prst="rect">
+            <a:avLst/>
+          </a:prstGeom>
+          <a:noFill/>
+        </p:spPr>
+        <p:txBody>
+          <a:bodyPr wrap="square" rtlCol="0">
+            <a:spAutoFit/>
+          </a:bodyPr>
+          <a:lstStyle/>
+          <a:p>
+            <a:r>
+              <a:rPr lang="en-US" dirty="0"/>
+              <a:t>Here is the list of available hot keys. </a:t>
+            </a:r>
+          </a:p>
+        </p:txBody>
+      </p:sp>
+      <p:pic>
+        <p:nvPicPr>
+          <p:cNvPr id="14" name="Picture 13">
+            <a:extLst>
+              <a:ext uri="{FF2B5EF4-FFF2-40B4-BE49-F238E27FC236}">
+                <a16:creationId xmlns:a16="http://schemas.microsoft.com/office/drawing/2014/main" id="{CFE113D8-CA5F-2E90-8CF6-6A357BB21456}"/>
+              </a:ext>
+            </a:extLst>
+          </p:cNvPr>
+          <p:cNvPicPr>
+            <a:picLocks noChangeAspect="1"/>
+          </p:cNvPicPr>
+          <p:nvPr/>
+        </p:nvPicPr>
+        <p:blipFill>
+          <a:blip r:embed="rId4"/>
+          <a:stretch>
+            <a:fillRect/>
+          </a:stretch>
+        </p:blipFill>
+        <p:spPr>
+          <a:xfrm>
+            <a:off x="2910841" y="7106405"/>
+            <a:ext cx="6746560" cy="3649634"/>
+          </a:xfrm>
+          <a:prstGeom prst="rect">
+            <a:avLst/>
+          </a:prstGeom>
+        </p:spPr>
+      </p:pic>
+      <p:sp>
+        <p:nvSpPr>
+          <p:cNvPr id="15" name="TextBox 14">
+            <a:extLst>
+              <a:ext uri="{FF2B5EF4-FFF2-40B4-BE49-F238E27FC236}">
+                <a16:creationId xmlns:a16="http://schemas.microsoft.com/office/drawing/2014/main" id="{FDFBB75A-89C4-6A01-46FF-3470AE9125ED}"/>
+              </a:ext>
+            </a:extLst>
+          </p:cNvPr>
+          <p:cNvSpPr txBox="1"/>
+          <p:nvPr/>
+        </p:nvSpPr>
+        <p:spPr>
+          <a:xfrm>
+            <a:off x="3251200" y="6776720"/>
+            <a:ext cx="3667760" cy="369332"/>
+          </a:xfrm>
+          <a:prstGeom prst="rect">
+            <a:avLst/>
+          </a:prstGeom>
+          <a:noFill/>
+        </p:spPr>
+        <p:txBody>
+          <a:bodyPr wrap="square" rtlCol="0">
+            <a:spAutoFit/>
+          </a:bodyPr>
+          <a:lstStyle/>
+          <a:p>
+            <a:pPr algn="ctr"/>
+            <a:r>
+              <a:rPr lang="en-US" b="1" dirty="0"/>
+              <a:t>App interface</a:t>
+            </a:r>
+          </a:p>
+        </p:txBody>
+      </p:sp>
+      <p:sp>
+        <p:nvSpPr>
+          <p:cNvPr id="16" name="TextBox 15">
+            <a:extLst>
+              <a:ext uri="{FF2B5EF4-FFF2-40B4-BE49-F238E27FC236}">
+                <a16:creationId xmlns:a16="http://schemas.microsoft.com/office/drawing/2014/main" id="{4BAF7855-5CC0-C7CE-4872-43C7CB273B2E}"/>
+              </a:ext>
+            </a:extLst>
+          </p:cNvPr>
+          <p:cNvSpPr txBox="1"/>
+          <p:nvPr/>
+        </p:nvSpPr>
+        <p:spPr>
+          <a:xfrm>
+            <a:off x="218440" y="7146052"/>
+            <a:ext cx="1889760" cy="830997"/>
+          </a:xfrm>
+          <a:prstGeom prst="rect">
+            <a:avLst/>
+          </a:prstGeom>
+          <a:noFill/>
+        </p:spPr>
+        <p:txBody>
+          <a:bodyPr wrap="square" rtlCol="0">
+            <a:spAutoFit/>
+          </a:bodyPr>
+          <a:lstStyle/>
+          <a:p>
+            <a:r>
+              <a:rPr lang="en-US" sz="1200" dirty="0"/>
+              <a:t>If you haven’t create anything yet. Press this to open the folder to your image</a:t>
+            </a:r>
+          </a:p>
+        </p:txBody>
+      </p:sp>
+      <p:cxnSp>
+        <p:nvCxnSpPr>
+          <p:cNvPr id="18" name="Straight Arrow Connector 17">
+            <a:extLst>
+              <a:ext uri="{FF2B5EF4-FFF2-40B4-BE49-F238E27FC236}">
+                <a16:creationId xmlns:a16="http://schemas.microsoft.com/office/drawing/2014/main" id="{67D3923A-5815-BCAA-1C8F-3DF35CEC6191}"/>
+              </a:ext>
+            </a:extLst>
+          </p:cNvPr>
+          <p:cNvCxnSpPr>
+            <a:stCxn id="16" idx="3"/>
+          </p:cNvCxnSpPr>
+          <p:nvPr/>
+        </p:nvCxnSpPr>
+        <p:spPr>
+          <a:xfrm>
+            <a:off x="2108200" y="7561551"/>
+            <a:ext cx="914400" cy="144809"/>
+          </a:xfrm>
+          <a:prstGeom prst="straightConnector1">
+            <a:avLst/>
+          </a:prstGeom>
+          <a:ln w="19050">
+            <a:solidFill>
+              <a:srgbClr val="FF0000"/>
+            </a:solidFill>
+            <a:tailEnd type="triangle"/>
+          </a:ln>
+        </p:spPr>
+        <p:style>
+          <a:lnRef idx="1">
+            <a:schemeClr val="accent1"/>
+          </a:lnRef>
+          <a:fillRef idx="0">
+            <a:schemeClr val="accent1"/>
+          </a:fillRef>
+          <a:effectRef idx="0">
+            <a:schemeClr val="accent1"/>
+          </a:effectRef>
+          <a:fontRef idx="minor">
+            <a:schemeClr val="tx1"/>
+          </a:fontRef>
+        </p:style>
+      </p:cxnSp>
+      <p:sp>
+        <p:nvSpPr>
+          <p:cNvPr id="19" name="TextBox 18">
+            <a:extLst>
+              <a:ext uri="{FF2B5EF4-FFF2-40B4-BE49-F238E27FC236}">
+                <a16:creationId xmlns:a16="http://schemas.microsoft.com/office/drawing/2014/main" id="{FC2A3DF8-A13B-9D76-AB16-D3DDD46C2DB2}"/>
+              </a:ext>
+            </a:extLst>
+          </p:cNvPr>
+          <p:cNvSpPr txBox="1"/>
+          <p:nvPr/>
+        </p:nvSpPr>
+        <p:spPr>
+          <a:xfrm>
+            <a:off x="218440" y="8016696"/>
+            <a:ext cx="1889760" cy="646331"/>
+          </a:xfrm>
+          <a:prstGeom prst="rect">
+            <a:avLst/>
+          </a:prstGeom>
+          <a:noFill/>
+        </p:spPr>
+        <p:txBody>
+          <a:bodyPr wrap="square" rtlCol="0">
+            <a:spAutoFit/>
+          </a:bodyPr>
+          <a:lstStyle/>
+          <a:p>
+            <a:r>
+              <a:rPr lang="en-US" sz="1200" dirty="0"/>
+              <a:t>Then press this to open the folder to where you save the annotation information</a:t>
+            </a:r>
+          </a:p>
+        </p:txBody>
+      </p:sp>
+      <p:cxnSp>
+        <p:nvCxnSpPr>
+          <p:cNvPr id="21" name="Straight Arrow Connector 20">
+            <a:extLst>
+              <a:ext uri="{FF2B5EF4-FFF2-40B4-BE49-F238E27FC236}">
+                <a16:creationId xmlns:a16="http://schemas.microsoft.com/office/drawing/2014/main" id="{E7C41071-C1EE-2885-2E19-BDF323F260C2}"/>
+              </a:ext>
+            </a:extLst>
+          </p:cNvPr>
+          <p:cNvCxnSpPr>
+            <a:stCxn id="19" idx="3"/>
+          </p:cNvCxnSpPr>
+          <p:nvPr/>
+        </p:nvCxnSpPr>
+        <p:spPr>
+          <a:xfrm flipV="1">
+            <a:off x="2108200" y="8016696"/>
+            <a:ext cx="878840" cy="323166"/>
+          </a:xfrm>
+          <a:prstGeom prst="straightConnector1">
+            <a:avLst/>
+          </a:prstGeom>
+          <a:ln w="38100">
+            <a:solidFill>
+              <a:srgbClr val="FF0000"/>
+            </a:solidFill>
+            <a:tailEnd type="triangle"/>
+          </a:ln>
+        </p:spPr>
+        <p:style>
+          <a:lnRef idx="1">
+            <a:schemeClr val="accent1"/>
+          </a:lnRef>
+          <a:fillRef idx="0">
+            <a:schemeClr val="accent1"/>
+          </a:fillRef>
+          <a:effectRef idx="0">
+            <a:schemeClr val="accent1"/>
+          </a:effectRef>
+          <a:fontRef idx="minor">
+            <a:schemeClr val="tx1"/>
+          </a:fontRef>
+        </p:style>
+      </p:cxnSp>
+      <p:sp>
+        <p:nvSpPr>
+          <p:cNvPr id="22" name="TextBox 21">
+            <a:extLst>
+              <a:ext uri="{FF2B5EF4-FFF2-40B4-BE49-F238E27FC236}">
+                <a16:creationId xmlns:a16="http://schemas.microsoft.com/office/drawing/2014/main" id="{1D90B3DE-A86D-5A08-FEB8-B3FDC01EA29D}"/>
+              </a:ext>
+            </a:extLst>
+          </p:cNvPr>
+          <p:cNvSpPr txBox="1"/>
+          <p:nvPr/>
+        </p:nvSpPr>
+        <p:spPr>
+          <a:xfrm>
+            <a:off x="218440" y="11008834"/>
+            <a:ext cx="2575560" cy="600164"/>
+          </a:xfrm>
+          <a:prstGeom prst="rect">
+            <a:avLst/>
+          </a:prstGeom>
+          <a:noFill/>
+        </p:spPr>
+        <p:txBody>
+          <a:bodyPr wrap="square" rtlCol="0">
+            <a:spAutoFit/>
+          </a:bodyPr>
+          <a:lstStyle/>
+          <a:p>
+            <a:r>
+              <a:rPr lang="en-US" sz="1100" dirty="0"/>
+              <a:t>Then it is just the matter of drawing the bounding box, assign a label for it and the save it</a:t>
+            </a:r>
+            <a:endParaRPr lang="en-US" sz="1200" dirty="0"/>
+          </a:p>
+        </p:txBody>
+      </p:sp>
+      <p:pic>
+        <p:nvPicPr>
+          <p:cNvPr id="24" name="Picture 23">
+            <a:extLst>
+              <a:ext uri="{FF2B5EF4-FFF2-40B4-BE49-F238E27FC236}">
+                <a16:creationId xmlns:a16="http://schemas.microsoft.com/office/drawing/2014/main" id="{7FDC44A4-C99F-4E65-977A-F8F2F029BA81}"/>
+              </a:ext>
+            </a:extLst>
+          </p:cNvPr>
+          <p:cNvPicPr>
+            <a:picLocks noChangeAspect="1"/>
+          </p:cNvPicPr>
+          <p:nvPr/>
+        </p:nvPicPr>
+        <p:blipFill>
+          <a:blip r:embed="rId5"/>
+          <a:stretch>
+            <a:fillRect/>
+          </a:stretch>
+        </p:blipFill>
+        <p:spPr>
+          <a:xfrm>
+            <a:off x="2910841" y="11003174"/>
+            <a:ext cx="5392387" cy="2926292"/>
+          </a:xfrm>
+          <a:prstGeom prst="rect">
+            <a:avLst/>
+          </a:prstGeom>
+        </p:spPr>
+      </p:pic>
+      <p:sp>
+        <p:nvSpPr>
+          <p:cNvPr id="25" name="TextBox 24">
+            <a:extLst>
+              <a:ext uri="{FF2B5EF4-FFF2-40B4-BE49-F238E27FC236}">
+                <a16:creationId xmlns:a16="http://schemas.microsoft.com/office/drawing/2014/main" id="{0D21EA67-C2CF-DAD2-35A3-F53D6832B2A7}"/>
+              </a:ext>
+            </a:extLst>
+          </p:cNvPr>
+          <p:cNvSpPr txBox="1"/>
+          <p:nvPr/>
+        </p:nvSpPr>
+        <p:spPr>
+          <a:xfrm>
+            <a:off x="257556" y="8815171"/>
+            <a:ext cx="1933448" cy="1200329"/>
+          </a:xfrm>
+          <a:prstGeom prst="rect">
+            <a:avLst/>
+          </a:prstGeom>
+          <a:noFill/>
+        </p:spPr>
+        <p:txBody>
+          <a:bodyPr wrap="square" rtlCol="0">
+            <a:spAutoFit/>
+          </a:bodyPr>
+          <a:lstStyle/>
+          <a:p>
+            <a:r>
+              <a:rPr lang="en-US" b="1" dirty="0"/>
+              <a:t>Remember to click using YOLO and not Pascal/VOC</a:t>
+            </a:r>
+          </a:p>
+        </p:txBody>
+      </p:sp>
+      <p:cxnSp>
+        <p:nvCxnSpPr>
+          <p:cNvPr id="27" name="Straight Arrow Connector 26">
+            <a:extLst>
+              <a:ext uri="{FF2B5EF4-FFF2-40B4-BE49-F238E27FC236}">
+                <a16:creationId xmlns:a16="http://schemas.microsoft.com/office/drawing/2014/main" id="{E1AC6BCF-8EBE-C713-70CC-3899E9CD618C}"/>
+              </a:ext>
+            </a:extLst>
+          </p:cNvPr>
+          <p:cNvCxnSpPr>
+            <a:stCxn id="25" idx="3"/>
+          </p:cNvCxnSpPr>
+          <p:nvPr/>
+        </p:nvCxnSpPr>
+        <p:spPr>
+          <a:xfrm flipV="1">
+            <a:off x="2191004" y="9247632"/>
+            <a:ext cx="796036" cy="167704"/>
+          </a:xfrm>
+          <a:prstGeom prst="straightConnector1">
+            <a:avLst/>
+          </a:prstGeom>
+          <a:ln w="38100">
+            <a:solidFill>
+              <a:srgbClr val="FF0000"/>
+            </a:solidFill>
+            <a:tailEnd type="triangle"/>
+          </a:ln>
+        </p:spPr>
+        <p:style>
+          <a:lnRef idx="1">
+            <a:schemeClr val="accent1"/>
+          </a:lnRef>
+          <a:fillRef idx="0">
+            <a:schemeClr val="accent1"/>
+          </a:fillRef>
+          <a:effectRef idx="0">
+            <a:schemeClr val="accent1"/>
+          </a:effectRef>
+          <a:fontRef idx="minor">
+            <a:schemeClr val="tx1"/>
+          </a:fontRef>
+        </p:style>
+      </p:cxnSp>
+      <p:sp>
+        <p:nvSpPr>
+          <p:cNvPr id="28" name="TextBox 27">
+            <a:extLst>
+              <a:ext uri="{FF2B5EF4-FFF2-40B4-BE49-F238E27FC236}">
+                <a16:creationId xmlns:a16="http://schemas.microsoft.com/office/drawing/2014/main" id="{11CCB6DB-F061-2B01-7395-159732C26AE6}"/>
+              </a:ext>
+            </a:extLst>
+          </p:cNvPr>
+          <p:cNvSpPr txBox="1"/>
+          <p:nvPr/>
+        </p:nvSpPr>
+        <p:spPr>
+          <a:xfrm>
+            <a:off x="257556" y="11861435"/>
+            <a:ext cx="2327148" cy="276999"/>
+          </a:xfrm>
+          <a:prstGeom prst="rect">
+            <a:avLst/>
+          </a:prstGeom>
+          <a:noFill/>
+        </p:spPr>
+        <p:txBody>
+          <a:bodyPr wrap="square" rtlCol="0">
+            <a:spAutoFit/>
+          </a:bodyPr>
+          <a:lstStyle/>
+          <a:p>
+            <a:r>
+              <a:rPr lang="en-US" sz="1200" dirty="0"/>
+              <a:t>Remember to choose auto saving</a:t>
+            </a:r>
+          </a:p>
+        </p:txBody>
+      </p:sp>
+      <p:cxnSp>
+        <p:nvCxnSpPr>
+          <p:cNvPr id="30" name="Straight Arrow Connector 29">
+            <a:extLst>
+              <a:ext uri="{FF2B5EF4-FFF2-40B4-BE49-F238E27FC236}">
+                <a16:creationId xmlns:a16="http://schemas.microsoft.com/office/drawing/2014/main" id="{C002F0D2-C4B0-577B-B157-06F8DB7547FF}"/>
+              </a:ext>
+            </a:extLst>
+          </p:cNvPr>
+          <p:cNvCxnSpPr>
+            <a:stCxn id="28" idx="3"/>
+          </p:cNvCxnSpPr>
+          <p:nvPr/>
+        </p:nvCxnSpPr>
+        <p:spPr>
+          <a:xfrm flipV="1">
+            <a:off x="2584704" y="11259312"/>
+            <a:ext cx="579120" cy="740623"/>
+          </a:xfrm>
+          <a:prstGeom prst="straightConnector1">
+            <a:avLst/>
+          </a:prstGeom>
+          <a:ln w="38100">
+            <a:solidFill>
+              <a:srgbClr val="FF0000"/>
+            </a:solidFill>
+            <a:tailEnd type="triangle"/>
+          </a:ln>
+        </p:spPr>
+        <p:style>
+          <a:lnRef idx="1">
+            <a:schemeClr val="accent1"/>
+          </a:lnRef>
+          <a:fillRef idx="0">
+            <a:schemeClr val="accent1"/>
+          </a:fillRef>
+          <a:effectRef idx="0">
+            <a:schemeClr val="accent1"/>
+          </a:effectRef>
+          <a:fontRef idx="minor">
+            <a:schemeClr val="tx1"/>
+          </a:fontRef>
+        </p:style>
+      </p:cxnSp>
+    </p:spTree>
+    <p:extLst>
+      <p:ext uri="{BB962C8B-B14F-4D97-AF65-F5344CB8AC3E}">
+        <p14:creationId xmlns:p14="http://schemas.microsoft.com/office/powerpoint/2010/main" val="3353160673"/>
+      </p:ext>
+    </p:extLst>
+  </p:cSld>
+  <p:clrMapOvr>
+    <a:masterClrMapping/>
+  </p:clrMapOvr>
+</p:sld>
+</file>
+
 <file path=ppt/theme/theme1.xml><?xml version="1.0" encoding="utf-8"?>
 <a:theme xmlns:a="http://schemas.openxmlformats.org/drawingml/2006/main" name="Office Theme">
   <a:themeElements>

</xml_diff>